<commit_message>
changes to phase2 ppt
</commit_message>
<xml_diff>
--- a/diagrams/phase2/FS1030 - Phase 2 - Abstract SQL.pptx
+++ b/diagrams/phase2/FS1030 - Phase 2 - Abstract SQL.pptx
@@ -18,6 +18,12 @@
     <p:sldId id="263" r:id="rId13"/>
     <p:sldId id="264" r:id="rId14"/>
     <p:sldId id="265" r:id="rId15"/>
+    <p:sldId id="266" r:id="rId16"/>
+    <p:sldId id="267" r:id="rId17"/>
+    <p:sldId id="268" r:id="rId18"/>
+    <p:sldId id="269" r:id="rId19"/>
+    <p:sldId id="270" r:id="rId20"/>
+    <p:sldId id="271" r:id="rId21"/>
   </p:sldIdLst>
   <p:sldSz cy="5143500" cx="9144000"/>
   <p:notesSz cx="6858000" cy="9144000"/>
@@ -799,7 +805,7 @@
   <p:cSld>
     <p:spTree>
       <p:nvGrpSpPr>
-        <p:cNvPr id="98" name="Shape 98"/>
+        <p:cNvPr id="100" name="Shape 100"/>
         <p:cNvGrpSpPr/>
         <p:nvPr/>
       </p:nvGrpSpPr>
@@ -813,7 +819,7 @@
       </p:grpSpPr>
       <p:sp>
         <p:nvSpPr>
-          <p:cNvPr id="99" name="Google Shape;99;g5dbe2cd7cb_0_25:notes"/>
+          <p:cNvPr id="101" name="Google Shape;101;g5e0f051925_0_10:notes"/>
           <p:cNvSpPr/>
           <p:nvPr>
             <p:ph idx="2" type="sldImg"/>
@@ -848,7 +854,601 @@
       </p:sp>
       <p:sp>
         <p:nvSpPr>
-          <p:cNvPr id="100" name="Google Shape;100;g5dbe2cd7cb_0_25:notes"/>
+          <p:cNvPr id="102" name="Google Shape;102;g5e0f051925_0_10:notes"/>
+          <p:cNvSpPr txBox="1"/>
+          <p:nvPr>
+            <p:ph idx="1" type="body"/>
+          </p:nvPr>
+        </p:nvSpPr>
+        <p:spPr>
+          <a:xfrm>
+            <a:off x="685800" y="4343400"/>
+            <a:ext cx="5486400" cy="4114800"/>
+          </a:xfrm>
+          <a:prstGeom prst="rect">
+            <a:avLst/>
+          </a:prstGeom>
+        </p:spPr>
+        <p:txBody>
+          <a:bodyPr anchorCtr="0" anchor="t" bIns="91425" lIns="91425" spcFirstLastPara="1" rIns="91425" wrap="square" tIns="91425">
+            <a:noAutofit/>
+          </a:bodyPr>
+          <a:lstStyle/>
+          <a:p>
+            <a:pPr indent="0" lvl="0" marL="0" rtl="0" algn="l">
+              <a:spcBef>
+                <a:spcPts val="0"/>
+              </a:spcBef>
+              <a:spcAft>
+                <a:spcPts val="0"/>
+              </a:spcAft>
+              <a:buNone/>
+            </a:pPr>
+            <a:r>
+              <a:t/>
+            </a:r>
+            <a:endParaRPr/>
+          </a:p>
+        </p:txBody>
+      </p:sp>
+    </p:spTree>
+  </p:cSld>
+  <p:clrMapOvr>
+    <a:masterClrMapping/>
+  </p:clrMapOvr>
+</p:notes>
+</file>
+
+<file path=ppt/notesSlides/notesSlide11.xml><?xml version="1.0" encoding="utf-8"?>
+<p:notes xmlns:a="http://schemas.openxmlformats.org/drawingml/2006/main" xmlns:r="http://schemas.openxmlformats.org/officeDocument/2006/relationships" xmlns:mc="http://schemas.openxmlformats.org/markup-compatibility/2006" xmlns:mv="urn:schemas-microsoft-com:mac:vml" xmlns:p="http://schemas.openxmlformats.org/presentationml/2006/main" xmlns:c="http://schemas.openxmlformats.org/drawingml/2006/chart" xmlns:dgm="http://schemas.openxmlformats.org/drawingml/2006/diagram" xmlns:o="urn:schemas-microsoft-com:office:office" xmlns:v="urn:schemas-microsoft-com:vml" xmlns:pvml="urn:schemas-microsoft-com:office:powerpoint" xmlns:com="http://schemas.openxmlformats.org/drawingml/2006/compatibility" xmlns:p14="http://schemas.microsoft.com/office/powerpoint/2010/main" xmlns:p15="http://schemas.microsoft.com/office/powerpoint/2012/main" showMasterPhAnim="0" showMasterSp="0">
+  <p:cSld>
+    <p:spTree>
+      <p:nvGrpSpPr>
+        <p:cNvPr id="106" name="Shape 106"/>
+        <p:cNvGrpSpPr/>
+        <p:nvPr/>
+      </p:nvGrpSpPr>
+      <p:grpSpPr>
+        <a:xfrm>
+          <a:off x="0" y="0"/>
+          <a:ext cx="0" cy="0"/>
+          <a:chOff x="0" y="0"/>
+          <a:chExt cx="0" cy="0"/>
+        </a:xfrm>
+      </p:grpSpPr>
+      <p:sp>
+        <p:nvSpPr>
+          <p:cNvPr id="107" name="Google Shape;107;g5e0f051925_0_15:notes"/>
+          <p:cNvSpPr/>
+          <p:nvPr>
+            <p:ph idx="2" type="sldImg"/>
+          </p:nvPr>
+        </p:nvSpPr>
+        <p:spPr>
+          <a:xfrm>
+            <a:off x="381300" y="685800"/>
+            <a:ext cx="6096000" cy="3429000"/>
+          </a:xfrm>
+          <a:custGeom>
+            <a:rect b="b" l="l" r="r" t="t"/>
+            <a:pathLst>
+              <a:path extrusionOk="0" h="120000" w="120000">
+                <a:moveTo>
+                  <a:pt x="0" y="0"/>
+                </a:moveTo>
+                <a:lnTo>
+                  <a:pt x="120000" y="0"/>
+                </a:lnTo>
+                <a:lnTo>
+                  <a:pt x="120000" y="120000"/>
+                </a:lnTo>
+                <a:lnTo>
+                  <a:pt x="0" y="120000"/>
+                </a:lnTo>
+                <a:close/>
+              </a:path>
+            </a:pathLst>
+          </a:custGeom>
+        </p:spPr>
+      </p:sp>
+      <p:sp>
+        <p:nvSpPr>
+          <p:cNvPr id="108" name="Google Shape;108;g5e0f051925_0_15:notes"/>
+          <p:cNvSpPr txBox="1"/>
+          <p:nvPr>
+            <p:ph idx="1" type="body"/>
+          </p:nvPr>
+        </p:nvSpPr>
+        <p:spPr>
+          <a:xfrm>
+            <a:off x="685800" y="4343400"/>
+            <a:ext cx="5486400" cy="4114800"/>
+          </a:xfrm>
+          <a:prstGeom prst="rect">
+            <a:avLst/>
+          </a:prstGeom>
+        </p:spPr>
+        <p:txBody>
+          <a:bodyPr anchorCtr="0" anchor="t" bIns="91425" lIns="91425" spcFirstLastPara="1" rIns="91425" wrap="square" tIns="91425">
+            <a:noAutofit/>
+          </a:bodyPr>
+          <a:lstStyle/>
+          <a:p>
+            <a:pPr indent="0" lvl="0" marL="0" rtl="0" algn="l">
+              <a:spcBef>
+                <a:spcPts val="0"/>
+              </a:spcBef>
+              <a:spcAft>
+                <a:spcPts val="0"/>
+              </a:spcAft>
+              <a:buNone/>
+            </a:pPr>
+            <a:r>
+              <a:t/>
+            </a:r>
+            <a:endParaRPr/>
+          </a:p>
+        </p:txBody>
+      </p:sp>
+    </p:spTree>
+  </p:cSld>
+  <p:clrMapOvr>
+    <a:masterClrMapping/>
+  </p:clrMapOvr>
+</p:notes>
+</file>
+
+<file path=ppt/notesSlides/notesSlide12.xml><?xml version="1.0" encoding="utf-8"?>
+<p:notes xmlns:a="http://schemas.openxmlformats.org/drawingml/2006/main" xmlns:r="http://schemas.openxmlformats.org/officeDocument/2006/relationships" xmlns:mc="http://schemas.openxmlformats.org/markup-compatibility/2006" xmlns:mv="urn:schemas-microsoft-com:mac:vml" xmlns:p="http://schemas.openxmlformats.org/presentationml/2006/main" xmlns:c="http://schemas.openxmlformats.org/drawingml/2006/chart" xmlns:dgm="http://schemas.openxmlformats.org/drawingml/2006/diagram" xmlns:o="urn:schemas-microsoft-com:office:office" xmlns:v="urn:schemas-microsoft-com:vml" xmlns:pvml="urn:schemas-microsoft-com:office:powerpoint" xmlns:com="http://schemas.openxmlformats.org/drawingml/2006/compatibility" xmlns:p14="http://schemas.microsoft.com/office/powerpoint/2010/main" xmlns:p15="http://schemas.microsoft.com/office/powerpoint/2012/main" showMasterPhAnim="0" showMasterSp="0">
+  <p:cSld>
+    <p:spTree>
+      <p:nvGrpSpPr>
+        <p:cNvPr id="112" name="Shape 112"/>
+        <p:cNvGrpSpPr/>
+        <p:nvPr/>
+      </p:nvGrpSpPr>
+      <p:grpSpPr>
+        <a:xfrm>
+          <a:off x="0" y="0"/>
+          <a:ext cx="0" cy="0"/>
+          <a:chOff x="0" y="0"/>
+          <a:chExt cx="0" cy="0"/>
+        </a:xfrm>
+      </p:grpSpPr>
+      <p:sp>
+        <p:nvSpPr>
+          <p:cNvPr id="113" name="Google Shape;113;g5dbe2cd7cb_0_5:notes"/>
+          <p:cNvSpPr/>
+          <p:nvPr>
+            <p:ph idx="2" type="sldImg"/>
+          </p:nvPr>
+        </p:nvSpPr>
+        <p:spPr>
+          <a:xfrm>
+            <a:off x="381300" y="685800"/>
+            <a:ext cx="6096000" cy="3429000"/>
+          </a:xfrm>
+          <a:custGeom>
+            <a:rect b="b" l="l" r="r" t="t"/>
+            <a:pathLst>
+              <a:path extrusionOk="0" h="120000" w="120000">
+                <a:moveTo>
+                  <a:pt x="0" y="0"/>
+                </a:moveTo>
+                <a:lnTo>
+                  <a:pt x="120000" y="0"/>
+                </a:lnTo>
+                <a:lnTo>
+                  <a:pt x="120000" y="120000"/>
+                </a:lnTo>
+                <a:lnTo>
+                  <a:pt x="0" y="120000"/>
+                </a:lnTo>
+                <a:close/>
+              </a:path>
+            </a:pathLst>
+          </a:custGeom>
+        </p:spPr>
+      </p:sp>
+      <p:sp>
+        <p:nvSpPr>
+          <p:cNvPr id="114" name="Google Shape;114;g5dbe2cd7cb_0_5:notes"/>
+          <p:cNvSpPr txBox="1"/>
+          <p:nvPr>
+            <p:ph idx="1" type="body"/>
+          </p:nvPr>
+        </p:nvSpPr>
+        <p:spPr>
+          <a:xfrm>
+            <a:off x="685800" y="4343400"/>
+            <a:ext cx="5486400" cy="4114800"/>
+          </a:xfrm>
+          <a:prstGeom prst="rect">
+            <a:avLst/>
+          </a:prstGeom>
+        </p:spPr>
+        <p:txBody>
+          <a:bodyPr anchorCtr="0" anchor="t" bIns="91425" lIns="91425" spcFirstLastPara="1" rIns="91425" wrap="square" tIns="91425">
+            <a:noAutofit/>
+          </a:bodyPr>
+          <a:lstStyle/>
+          <a:p>
+            <a:pPr indent="0" lvl="0" marL="0" rtl="0" algn="l">
+              <a:spcBef>
+                <a:spcPts val="0"/>
+              </a:spcBef>
+              <a:spcAft>
+                <a:spcPts val="0"/>
+              </a:spcAft>
+              <a:buNone/>
+            </a:pPr>
+            <a:r>
+              <a:t/>
+            </a:r>
+            <a:endParaRPr/>
+          </a:p>
+        </p:txBody>
+      </p:sp>
+    </p:spTree>
+  </p:cSld>
+  <p:clrMapOvr>
+    <a:masterClrMapping/>
+  </p:clrMapOvr>
+</p:notes>
+</file>
+
+<file path=ppt/notesSlides/notesSlide13.xml><?xml version="1.0" encoding="utf-8"?>
+<p:notes xmlns:a="http://schemas.openxmlformats.org/drawingml/2006/main" xmlns:r="http://schemas.openxmlformats.org/officeDocument/2006/relationships" xmlns:mc="http://schemas.openxmlformats.org/markup-compatibility/2006" xmlns:mv="urn:schemas-microsoft-com:mac:vml" xmlns:p="http://schemas.openxmlformats.org/presentationml/2006/main" xmlns:c="http://schemas.openxmlformats.org/drawingml/2006/chart" xmlns:dgm="http://schemas.openxmlformats.org/drawingml/2006/diagram" xmlns:o="urn:schemas-microsoft-com:office:office" xmlns:v="urn:schemas-microsoft-com:vml" xmlns:pvml="urn:schemas-microsoft-com:office:powerpoint" xmlns:com="http://schemas.openxmlformats.org/drawingml/2006/compatibility" xmlns:p14="http://schemas.microsoft.com/office/powerpoint/2010/main" xmlns:p15="http://schemas.microsoft.com/office/powerpoint/2012/main" showMasterPhAnim="0" showMasterSp="0">
+  <p:cSld>
+    <p:spTree>
+      <p:nvGrpSpPr>
+        <p:cNvPr id="117" name="Shape 117"/>
+        <p:cNvGrpSpPr/>
+        <p:nvPr/>
+      </p:nvGrpSpPr>
+      <p:grpSpPr>
+        <a:xfrm>
+          <a:off x="0" y="0"/>
+          <a:ext cx="0" cy="0"/>
+          <a:chOff x="0" y="0"/>
+          <a:chExt cx="0" cy="0"/>
+        </a:xfrm>
+      </p:grpSpPr>
+      <p:sp>
+        <p:nvSpPr>
+          <p:cNvPr id="118" name="Google Shape;118;g5d30299014_0_0:notes"/>
+          <p:cNvSpPr/>
+          <p:nvPr>
+            <p:ph idx="2" type="sldImg"/>
+          </p:nvPr>
+        </p:nvSpPr>
+        <p:spPr>
+          <a:xfrm>
+            <a:off x="381300" y="685800"/>
+            <a:ext cx="6096000" cy="3429000"/>
+          </a:xfrm>
+          <a:custGeom>
+            <a:rect b="b" l="l" r="r" t="t"/>
+            <a:pathLst>
+              <a:path extrusionOk="0" h="120000" w="120000">
+                <a:moveTo>
+                  <a:pt x="0" y="0"/>
+                </a:moveTo>
+                <a:lnTo>
+                  <a:pt x="120000" y="0"/>
+                </a:lnTo>
+                <a:lnTo>
+                  <a:pt x="120000" y="120000"/>
+                </a:lnTo>
+                <a:lnTo>
+                  <a:pt x="0" y="120000"/>
+                </a:lnTo>
+                <a:close/>
+              </a:path>
+            </a:pathLst>
+          </a:custGeom>
+        </p:spPr>
+      </p:sp>
+      <p:sp>
+        <p:nvSpPr>
+          <p:cNvPr id="119" name="Google Shape;119;g5d30299014_0_0:notes"/>
+          <p:cNvSpPr txBox="1"/>
+          <p:nvPr>
+            <p:ph idx="1" type="body"/>
+          </p:nvPr>
+        </p:nvSpPr>
+        <p:spPr>
+          <a:xfrm>
+            <a:off x="685800" y="4343400"/>
+            <a:ext cx="5486400" cy="4114800"/>
+          </a:xfrm>
+          <a:prstGeom prst="rect">
+            <a:avLst/>
+          </a:prstGeom>
+        </p:spPr>
+        <p:txBody>
+          <a:bodyPr anchorCtr="0" anchor="t" bIns="91425" lIns="91425" spcFirstLastPara="1" rIns="91425" wrap="square" tIns="91425">
+            <a:noAutofit/>
+          </a:bodyPr>
+          <a:lstStyle/>
+          <a:p>
+            <a:pPr indent="0" lvl="0" marL="0" rtl="0" algn="l">
+              <a:spcBef>
+                <a:spcPts val="0"/>
+              </a:spcBef>
+              <a:spcAft>
+                <a:spcPts val="0"/>
+              </a:spcAft>
+              <a:buNone/>
+            </a:pPr>
+            <a:r>
+              <a:t/>
+            </a:r>
+            <a:endParaRPr/>
+          </a:p>
+        </p:txBody>
+      </p:sp>
+    </p:spTree>
+  </p:cSld>
+  <p:clrMapOvr>
+    <a:masterClrMapping/>
+  </p:clrMapOvr>
+</p:notes>
+</file>
+
+<file path=ppt/notesSlides/notesSlide14.xml><?xml version="1.0" encoding="utf-8"?>
+<p:notes xmlns:a="http://schemas.openxmlformats.org/drawingml/2006/main" xmlns:r="http://schemas.openxmlformats.org/officeDocument/2006/relationships" xmlns:mc="http://schemas.openxmlformats.org/markup-compatibility/2006" xmlns:mv="urn:schemas-microsoft-com:mac:vml" xmlns:p="http://schemas.openxmlformats.org/presentationml/2006/main" xmlns:c="http://schemas.openxmlformats.org/drawingml/2006/chart" xmlns:dgm="http://schemas.openxmlformats.org/drawingml/2006/diagram" xmlns:o="urn:schemas-microsoft-com:office:office" xmlns:v="urn:schemas-microsoft-com:vml" xmlns:pvml="urn:schemas-microsoft-com:office:powerpoint" xmlns:com="http://schemas.openxmlformats.org/drawingml/2006/compatibility" xmlns:p14="http://schemas.microsoft.com/office/powerpoint/2010/main" xmlns:p15="http://schemas.microsoft.com/office/powerpoint/2012/main" showMasterPhAnim="0" showMasterSp="0">
+  <p:cSld>
+    <p:spTree>
+      <p:nvGrpSpPr>
+        <p:cNvPr id="123" name="Shape 123"/>
+        <p:cNvGrpSpPr/>
+        <p:nvPr/>
+      </p:nvGrpSpPr>
+      <p:grpSpPr>
+        <a:xfrm>
+          <a:off x="0" y="0"/>
+          <a:ext cx="0" cy="0"/>
+          <a:chOff x="0" y="0"/>
+          <a:chExt cx="0" cy="0"/>
+        </a:xfrm>
+      </p:grpSpPr>
+      <p:sp>
+        <p:nvSpPr>
+          <p:cNvPr id="124" name="Google Shape;124;g5d30299014_0_5:notes"/>
+          <p:cNvSpPr/>
+          <p:nvPr>
+            <p:ph idx="2" type="sldImg"/>
+          </p:nvPr>
+        </p:nvSpPr>
+        <p:spPr>
+          <a:xfrm>
+            <a:off x="381300" y="685800"/>
+            <a:ext cx="6096000" cy="3429000"/>
+          </a:xfrm>
+          <a:custGeom>
+            <a:rect b="b" l="l" r="r" t="t"/>
+            <a:pathLst>
+              <a:path extrusionOk="0" h="120000" w="120000">
+                <a:moveTo>
+                  <a:pt x="0" y="0"/>
+                </a:moveTo>
+                <a:lnTo>
+                  <a:pt x="120000" y="0"/>
+                </a:lnTo>
+                <a:lnTo>
+                  <a:pt x="120000" y="120000"/>
+                </a:lnTo>
+                <a:lnTo>
+                  <a:pt x="0" y="120000"/>
+                </a:lnTo>
+                <a:close/>
+              </a:path>
+            </a:pathLst>
+          </a:custGeom>
+        </p:spPr>
+      </p:sp>
+      <p:sp>
+        <p:nvSpPr>
+          <p:cNvPr id="125" name="Google Shape;125;g5d30299014_0_5:notes"/>
+          <p:cNvSpPr txBox="1"/>
+          <p:nvPr>
+            <p:ph idx="1" type="body"/>
+          </p:nvPr>
+        </p:nvSpPr>
+        <p:spPr>
+          <a:xfrm>
+            <a:off x="685800" y="4343400"/>
+            <a:ext cx="5486400" cy="4114800"/>
+          </a:xfrm>
+          <a:prstGeom prst="rect">
+            <a:avLst/>
+          </a:prstGeom>
+        </p:spPr>
+        <p:txBody>
+          <a:bodyPr anchorCtr="0" anchor="t" bIns="91425" lIns="91425" spcFirstLastPara="1" rIns="91425" wrap="square" tIns="91425">
+            <a:noAutofit/>
+          </a:bodyPr>
+          <a:lstStyle/>
+          <a:p>
+            <a:pPr indent="0" lvl="0" marL="0" rtl="0" algn="l">
+              <a:spcBef>
+                <a:spcPts val="0"/>
+              </a:spcBef>
+              <a:spcAft>
+                <a:spcPts val="0"/>
+              </a:spcAft>
+              <a:buNone/>
+            </a:pPr>
+            <a:r>
+              <a:t/>
+            </a:r>
+            <a:endParaRPr/>
+          </a:p>
+        </p:txBody>
+      </p:sp>
+    </p:spTree>
+  </p:cSld>
+  <p:clrMapOvr>
+    <a:masterClrMapping/>
+  </p:clrMapOvr>
+</p:notes>
+</file>
+
+<file path=ppt/notesSlides/notesSlide15.xml><?xml version="1.0" encoding="utf-8"?>
+<p:notes xmlns:a="http://schemas.openxmlformats.org/drawingml/2006/main" xmlns:r="http://schemas.openxmlformats.org/officeDocument/2006/relationships" xmlns:mc="http://schemas.openxmlformats.org/markup-compatibility/2006" xmlns:mv="urn:schemas-microsoft-com:mac:vml" xmlns:p="http://schemas.openxmlformats.org/presentationml/2006/main" xmlns:c="http://schemas.openxmlformats.org/drawingml/2006/chart" xmlns:dgm="http://schemas.openxmlformats.org/drawingml/2006/diagram" xmlns:o="urn:schemas-microsoft-com:office:office" xmlns:v="urn:schemas-microsoft-com:vml" xmlns:pvml="urn:schemas-microsoft-com:office:powerpoint" xmlns:com="http://schemas.openxmlformats.org/drawingml/2006/compatibility" xmlns:p14="http://schemas.microsoft.com/office/powerpoint/2010/main" xmlns:p15="http://schemas.microsoft.com/office/powerpoint/2012/main" showMasterPhAnim="0" showMasterSp="0">
+  <p:cSld>
+    <p:spTree>
+      <p:nvGrpSpPr>
+        <p:cNvPr id="129" name="Shape 129"/>
+        <p:cNvGrpSpPr/>
+        <p:nvPr/>
+      </p:nvGrpSpPr>
+      <p:grpSpPr>
+        <a:xfrm>
+          <a:off x="0" y="0"/>
+          <a:ext cx="0" cy="0"/>
+          <a:chOff x="0" y="0"/>
+          <a:chExt cx="0" cy="0"/>
+        </a:xfrm>
+      </p:grpSpPr>
+      <p:sp>
+        <p:nvSpPr>
+          <p:cNvPr id="130" name="Google Shape;130;g5dbe2cd7cb_0_21:notes"/>
+          <p:cNvSpPr/>
+          <p:nvPr>
+            <p:ph idx="2" type="sldImg"/>
+          </p:nvPr>
+        </p:nvSpPr>
+        <p:spPr>
+          <a:xfrm>
+            <a:off x="381300" y="685800"/>
+            <a:ext cx="6096000" cy="3429000"/>
+          </a:xfrm>
+          <a:custGeom>
+            <a:rect b="b" l="l" r="r" t="t"/>
+            <a:pathLst>
+              <a:path extrusionOk="0" h="120000" w="120000">
+                <a:moveTo>
+                  <a:pt x="0" y="0"/>
+                </a:moveTo>
+                <a:lnTo>
+                  <a:pt x="120000" y="0"/>
+                </a:lnTo>
+                <a:lnTo>
+                  <a:pt x="120000" y="120000"/>
+                </a:lnTo>
+                <a:lnTo>
+                  <a:pt x="0" y="120000"/>
+                </a:lnTo>
+                <a:close/>
+              </a:path>
+            </a:pathLst>
+          </a:custGeom>
+        </p:spPr>
+      </p:sp>
+      <p:sp>
+        <p:nvSpPr>
+          <p:cNvPr id="131" name="Google Shape;131;g5dbe2cd7cb_0_21:notes"/>
+          <p:cNvSpPr txBox="1"/>
+          <p:nvPr>
+            <p:ph idx="1" type="body"/>
+          </p:nvPr>
+        </p:nvSpPr>
+        <p:spPr>
+          <a:xfrm>
+            <a:off x="685800" y="4343400"/>
+            <a:ext cx="5486400" cy="4114800"/>
+          </a:xfrm>
+          <a:prstGeom prst="rect">
+            <a:avLst/>
+          </a:prstGeom>
+        </p:spPr>
+        <p:txBody>
+          <a:bodyPr anchorCtr="0" anchor="t" bIns="91425" lIns="91425" spcFirstLastPara="1" rIns="91425" wrap="square" tIns="91425">
+            <a:noAutofit/>
+          </a:bodyPr>
+          <a:lstStyle/>
+          <a:p>
+            <a:pPr indent="0" lvl="0" marL="0" rtl="0" algn="l">
+              <a:spcBef>
+                <a:spcPts val="0"/>
+              </a:spcBef>
+              <a:spcAft>
+                <a:spcPts val="0"/>
+              </a:spcAft>
+              <a:buNone/>
+            </a:pPr>
+            <a:r>
+              <a:t/>
+            </a:r>
+            <a:endParaRPr/>
+          </a:p>
+        </p:txBody>
+      </p:sp>
+    </p:spTree>
+  </p:cSld>
+  <p:clrMapOvr>
+    <a:masterClrMapping/>
+  </p:clrMapOvr>
+</p:notes>
+</file>
+
+<file path=ppt/notesSlides/notesSlide16.xml><?xml version="1.0" encoding="utf-8"?>
+<p:notes xmlns:a="http://schemas.openxmlformats.org/drawingml/2006/main" xmlns:r="http://schemas.openxmlformats.org/officeDocument/2006/relationships" xmlns:mc="http://schemas.openxmlformats.org/markup-compatibility/2006" xmlns:mv="urn:schemas-microsoft-com:mac:vml" xmlns:p="http://schemas.openxmlformats.org/presentationml/2006/main" xmlns:c="http://schemas.openxmlformats.org/drawingml/2006/chart" xmlns:dgm="http://schemas.openxmlformats.org/drawingml/2006/diagram" xmlns:o="urn:schemas-microsoft-com:office:office" xmlns:v="urn:schemas-microsoft-com:vml" xmlns:pvml="urn:schemas-microsoft-com:office:powerpoint" xmlns:com="http://schemas.openxmlformats.org/drawingml/2006/compatibility" xmlns:p14="http://schemas.microsoft.com/office/powerpoint/2010/main" xmlns:p15="http://schemas.microsoft.com/office/powerpoint/2012/main" showMasterPhAnim="0" showMasterSp="0">
+  <p:cSld>
+    <p:spTree>
+      <p:nvGrpSpPr>
+        <p:cNvPr id="134" name="Shape 134"/>
+        <p:cNvGrpSpPr/>
+        <p:nvPr/>
+      </p:nvGrpSpPr>
+      <p:grpSpPr>
+        <a:xfrm>
+          <a:off x="0" y="0"/>
+          <a:ext cx="0" cy="0"/>
+          <a:chOff x="0" y="0"/>
+          <a:chExt cx="0" cy="0"/>
+        </a:xfrm>
+      </p:grpSpPr>
+      <p:sp>
+        <p:nvSpPr>
+          <p:cNvPr id="135" name="Google Shape;135;g5dbe2cd7cb_0_25:notes"/>
+          <p:cNvSpPr/>
+          <p:nvPr>
+            <p:ph idx="2" type="sldImg"/>
+          </p:nvPr>
+        </p:nvSpPr>
+        <p:spPr>
+          <a:xfrm>
+            <a:off x="381300" y="685800"/>
+            <a:ext cx="6096000" cy="3429000"/>
+          </a:xfrm>
+          <a:custGeom>
+            <a:rect b="b" l="l" r="r" t="t"/>
+            <a:pathLst>
+              <a:path extrusionOk="0" h="120000" w="120000">
+                <a:moveTo>
+                  <a:pt x="0" y="0"/>
+                </a:moveTo>
+                <a:lnTo>
+                  <a:pt x="120000" y="0"/>
+                </a:lnTo>
+                <a:lnTo>
+                  <a:pt x="120000" y="120000"/>
+                </a:lnTo>
+                <a:lnTo>
+                  <a:pt x="0" y="120000"/>
+                </a:lnTo>
+                <a:close/>
+              </a:path>
+            </a:pathLst>
+          </a:custGeom>
+        </p:spPr>
+      </p:sp>
+      <p:sp>
+        <p:nvSpPr>
+          <p:cNvPr id="136" name="Google Shape;136;g5dbe2cd7cb_0_25:notes"/>
           <p:cNvSpPr txBox="1"/>
           <p:nvPr>
             <p:ph idx="1" type="body"/>
@@ -1011,7 +1611,7 @@
       </p:grpSpPr>
       <p:sp>
         <p:nvSpPr>
-          <p:cNvPr id="62" name="Google Shape;62;g5dbe2cd7cb_0_9:notes"/>
+          <p:cNvPr id="62" name="Google Shape;62;g5e0f051925_0_0:notes"/>
           <p:cNvSpPr/>
           <p:nvPr>
             <p:ph idx="2" type="sldImg"/>
@@ -1046,7 +1646,7 @@
       </p:sp>
       <p:sp>
         <p:nvSpPr>
-          <p:cNvPr id="63" name="Google Shape;63;g5dbe2cd7cb_0_9:notes"/>
+          <p:cNvPr id="63" name="Google Shape;63;g5e0f051925_0_0:notes"/>
           <p:cNvSpPr txBox="1"/>
           <p:nvPr>
             <p:ph idx="1" type="body"/>
@@ -1096,7 +1696,7 @@
   <p:cSld>
     <p:spTree>
       <p:nvGrpSpPr>
-        <p:cNvPr id="66" name="Shape 66"/>
+        <p:cNvPr id="67" name="Shape 67"/>
         <p:cNvGrpSpPr/>
         <p:nvPr/>
       </p:nvGrpSpPr>
@@ -1110,7 +1710,7 @@
       </p:grpSpPr>
       <p:sp>
         <p:nvSpPr>
-          <p:cNvPr id="67" name="Google Shape;67;g5dbe2cd7cb_0_13:notes"/>
+          <p:cNvPr id="68" name="Google Shape;68;g5e0f051925_0_5:notes"/>
           <p:cNvSpPr/>
           <p:nvPr>
             <p:ph idx="2" type="sldImg"/>
@@ -1145,7 +1745,7 @@
       </p:sp>
       <p:sp>
         <p:nvSpPr>
-          <p:cNvPr id="68" name="Google Shape;68;g5dbe2cd7cb_0_13:notes"/>
+          <p:cNvPr id="69" name="Google Shape;69;g5e0f051925_0_5:notes"/>
           <p:cNvSpPr txBox="1"/>
           <p:nvPr>
             <p:ph idx="1" type="body"/>
@@ -1195,7 +1795,7 @@
   <p:cSld>
     <p:spTree>
       <p:nvGrpSpPr>
-        <p:cNvPr id="71" name="Shape 71"/>
+        <p:cNvPr id="73" name="Shape 73"/>
         <p:cNvGrpSpPr/>
         <p:nvPr/>
       </p:nvGrpSpPr>
@@ -1209,7 +1809,7 @@
       </p:grpSpPr>
       <p:sp>
         <p:nvSpPr>
-          <p:cNvPr id="72" name="Google Shape;72;g5dbe2cd7cb_0_17:notes"/>
+          <p:cNvPr id="74" name="Google Shape;74;g5dbe2cd7cb_0_9:notes"/>
           <p:cNvSpPr/>
           <p:nvPr>
             <p:ph idx="2" type="sldImg"/>
@@ -1244,7 +1844,7 @@
       </p:sp>
       <p:sp>
         <p:nvSpPr>
-          <p:cNvPr id="73" name="Google Shape;73;g5dbe2cd7cb_0_17:notes"/>
+          <p:cNvPr id="75" name="Google Shape;75;g5dbe2cd7cb_0_9:notes"/>
           <p:cNvSpPr txBox="1"/>
           <p:nvPr>
             <p:ph idx="1" type="body"/>
@@ -1294,7 +1894,7 @@
   <p:cSld>
     <p:spTree>
       <p:nvGrpSpPr>
-        <p:cNvPr id="76" name="Shape 76"/>
+        <p:cNvPr id="78" name="Shape 78"/>
         <p:cNvGrpSpPr/>
         <p:nvPr/>
       </p:nvGrpSpPr>
@@ -1308,7 +1908,7 @@
       </p:grpSpPr>
       <p:sp>
         <p:nvSpPr>
-          <p:cNvPr id="77" name="Google Shape;77;g5dbe2cd7cb_0_5:notes"/>
+          <p:cNvPr id="79" name="Google Shape;79;g5dbe2cd7cb_0_13:notes"/>
           <p:cNvSpPr/>
           <p:nvPr>
             <p:ph idx="2" type="sldImg"/>
@@ -1343,7 +1943,7 @@
       </p:sp>
       <p:sp>
         <p:nvSpPr>
-          <p:cNvPr id="78" name="Google Shape;78;g5dbe2cd7cb_0_5:notes"/>
+          <p:cNvPr id="80" name="Google Shape;80;g5dbe2cd7cb_0_13:notes"/>
           <p:cNvSpPr txBox="1"/>
           <p:nvPr>
             <p:ph idx="1" type="body"/>
@@ -1393,7 +1993,7 @@
   <p:cSld>
     <p:spTree>
       <p:nvGrpSpPr>
-        <p:cNvPr id="81" name="Shape 81"/>
+        <p:cNvPr id="83" name="Shape 83"/>
         <p:cNvGrpSpPr/>
         <p:nvPr/>
       </p:nvGrpSpPr>
@@ -1407,7 +2007,7 @@
       </p:grpSpPr>
       <p:sp>
         <p:nvSpPr>
-          <p:cNvPr id="82" name="Google Shape;82;g5d30299014_0_0:notes"/>
+          <p:cNvPr id="84" name="Google Shape;84;g5e0f051925_0_20:notes"/>
           <p:cNvSpPr/>
           <p:nvPr>
             <p:ph idx="2" type="sldImg"/>
@@ -1442,7 +2042,7 @@
       </p:sp>
       <p:sp>
         <p:nvSpPr>
-          <p:cNvPr id="83" name="Google Shape;83;g5d30299014_0_0:notes"/>
+          <p:cNvPr id="85" name="Google Shape;85;g5e0f051925_0_20:notes"/>
           <p:cNvSpPr txBox="1"/>
           <p:nvPr>
             <p:ph idx="1" type="body"/>
@@ -1492,7 +2092,7 @@
   <p:cSld>
     <p:spTree>
       <p:nvGrpSpPr>
-        <p:cNvPr id="87" name="Shape 87"/>
+        <p:cNvPr id="89" name="Shape 89"/>
         <p:cNvGrpSpPr/>
         <p:nvPr/>
       </p:nvGrpSpPr>
@@ -1506,7 +2106,7 @@
       </p:grpSpPr>
       <p:sp>
         <p:nvSpPr>
-          <p:cNvPr id="88" name="Google Shape;88;g5d30299014_0_5:notes"/>
+          <p:cNvPr id="90" name="Google Shape;90;g5e0f051925_0_25:notes"/>
           <p:cNvSpPr/>
           <p:nvPr>
             <p:ph idx="2" type="sldImg"/>
@@ -1541,7 +2141,7 @@
       </p:sp>
       <p:sp>
         <p:nvSpPr>
-          <p:cNvPr id="89" name="Google Shape;89;g5d30299014_0_5:notes"/>
+          <p:cNvPr id="91" name="Google Shape;91;g5e0f051925_0_25:notes"/>
           <p:cNvSpPr txBox="1"/>
           <p:nvPr>
             <p:ph idx="1" type="body"/>
@@ -1591,7 +2191,7 @@
   <p:cSld>
     <p:spTree>
       <p:nvGrpSpPr>
-        <p:cNvPr id="93" name="Shape 93"/>
+        <p:cNvPr id="95" name="Shape 95"/>
         <p:cNvGrpSpPr/>
         <p:nvPr/>
       </p:nvGrpSpPr>
@@ -1605,7 +2205,7 @@
       </p:grpSpPr>
       <p:sp>
         <p:nvSpPr>
-          <p:cNvPr id="94" name="Google Shape;94;g5dbe2cd7cb_0_21:notes"/>
+          <p:cNvPr id="96" name="Google Shape;96;g5dbe2cd7cb_0_17:notes"/>
           <p:cNvSpPr/>
           <p:nvPr>
             <p:ph idx="2" type="sldImg"/>
@@ -1640,7 +2240,7 @@
       </p:sp>
       <p:sp>
         <p:nvSpPr>
-          <p:cNvPr id="95" name="Google Shape;95;g5dbe2cd7cb_0_21:notes"/>
+          <p:cNvPr id="97" name="Google Shape;97;g5dbe2cd7cb_0_17:notes"/>
           <p:cNvSpPr txBox="1"/>
           <p:nvPr>
             <p:ph idx="1" type="body"/>
@@ -6385,7 +6985,7 @@
             </a:pPr>
             <a:r>
               <a:rPr lang="fr"/>
-              <a:t>FS1030 - EMR Database</a:t>
+              <a:t>FS1030 - Group 3 - EMR Database</a:t>
             </a:r>
             <a:endParaRPr/>
           </a:p>
@@ -6600,7 +7200,7 @@
   <p:cSld>
     <p:spTree>
       <p:nvGrpSpPr>
-        <p:cNvPr id="101" name="Shape 101"/>
+        <p:cNvPr id="103" name="Shape 103"/>
         <p:cNvGrpSpPr/>
         <p:nvPr/>
       </p:nvGrpSpPr>
@@ -6614,7 +7214,1341 @@
       </p:grpSpPr>
       <p:sp>
         <p:nvSpPr>
-          <p:cNvPr id="102" name="Google Shape;102;p22"/>
+          <p:cNvPr id="104" name="Google Shape;104;p22"/>
+          <p:cNvSpPr txBox="1"/>
+          <p:nvPr>
+            <p:ph type="title"/>
+          </p:nvPr>
+        </p:nvSpPr>
+        <p:spPr>
+          <a:xfrm>
+            <a:off x="311700" y="-88375"/>
+            <a:ext cx="8520600" cy="572700"/>
+          </a:xfrm>
+          <a:prstGeom prst="rect">
+            <a:avLst/>
+          </a:prstGeom>
+        </p:spPr>
+        <p:txBody>
+          <a:bodyPr anchorCtr="0" anchor="t" bIns="91425" lIns="91425" spcFirstLastPara="1" rIns="91425" wrap="square" tIns="91425">
+            <a:noAutofit/>
+          </a:bodyPr>
+          <a:lstStyle/>
+          <a:p>
+            <a:pPr indent="0" lvl="0" marL="0" rtl="0" algn="l">
+              <a:spcBef>
+                <a:spcPts val="0"/>
+              </a:spcBef>
+              <a:spcAft>
+                <a:spcPts val="0"/>
+              </a:spcAft>
+              <a:buNone/>
+            </a:pPr>
+            <a:r>
+              <a:rPr lang="fr"/>
+              <a:t>Abstract Code - Care provider login</a:t>
+            </a:r>
+            <a:endParaRPr/>
+          </a:p>
+        </p:txBody>
+      </p:sp>
+      <p:sp>
+        <p:nvSpPr>
+          <p:cNvPr id="105" name="Google Shape;105;p22"/>
+          <p:cNvSpPr txBox="1"/>
+          <p:nvPr>
+            <p:ph idx="1" type="body"/>
+          </p:nvPr>
+        </p:nvSpPr>
+        <p:spPr>
+          <a:xfrm>
+            <a:off x="311700" y="390475"/>
+            <a:ext cx="8520600" cy="4570200"/>
+          </a:xfrm>
+          <a:prstGeom prst="rect">
+            <a:avLst/>
+          </a:prstGeom>
+        </p:spPr>
+        <p:txBody>
+          <a:bodyPr anchorCtr="0" anchor="t" bIns="91425" lIns="91425" spcFirstLastPara="1" rIns="91425" wrap="square" tIns="91425">
+            <a:noAutofit/>
+          </a:bodyPr>
+          <a:lstStyle/>
+          <a:p>
+            <a:pPr indent="0" lvl="0" marL="0" rtl="0" algn="l">
+              <a:spcBef>
+                <a:spcPts val="0"/>
+              </a:spcBef>
+              <a:spcAft>
+                <a:spcPts val="0"/>
+              </a:spcAft>
+              <a:buNone/>
+            </a:pPr>
+            <a:r>
+              <a:rPr b="1" lang="fr" u="sng"/>
+              <a:t>Task decomposition flow</a:t>
+            </a:r>
+            <a:endParaRPr b="1" u="sng"/>
+          </a:p>
+          <a:p>
+            <a:pPr indent="-342900" lvl="0" marL="457200" rtl="0" algn="l">
+              <a:spcBef>
+                <a:spcPts val="1600"/>
+              </a:spcBef>
+              <a:spcAft>
+                <a:spcPts val="0"/>
+              </a:spcAft>
+              <a:buSzPts val="1800"/>
+              <a:buChar char="●"/>
+            </a:pPr>
+            <a:r>
+              <a:rPr lang="fr"/>
+              <a:t>Lookup the database to verify whether username exists (based on </a:t>
+            </a:r>
+            <a:r>
+              <a:rPr b="1" lang="fr"/>
+              <a:t>username</a:t>
+            </a:r>
+            <a:r>
+              <a:rPr lang="fr"/>
+              <a:t>)</a:t>
+            </a:r>
+            <a:endParaRPr/>
+          </a:p>
+          <a:p>
+            <a:pPr indent="-342900" lvl="0" marL="457200" rtl="0" algn="l">
+              <a:spcBef>
+                <a:spcPts val="0"/>
+              </a:spcBef>
+              <a:spcAft>
+                <a:spcPts val="0"/>
+              </a:spcAft>
+              <a:buSzPts val="1800"/>
+              <a:buChar char="●"/>
+            </a:pPr>
+            <a:r>
+              <a:rPr lang="fr"/>
+              <a:t>Requires </a:t>
+            </a:r>
+            <a:r>
+              <a:rPr b="1" lang="fr"/>
+              <a:t>username </a:t>
+            </a:r>
+            <a:r>
+              <a:rPr lang="fr"/>
+              <a:t>/ </a:t>
+            </a:r>
+            <a:r>
+              <a:rPr b="1" lang="fr"/>
+              <a:t>password</a:t>
+            </a:r>
+            <a:endParaRPr b="1"/>
+          </a:p>
+          <a:p>
+            <a:pPr indent="-342900" lvl="0" marL="457200" rtl="0" algn="l">
+              <a:spcBef>
+                <a:spcPts val="0"/>
+              </a:spcBef>
+              <a:spcAft>
+                <a:spcPts val="0"/>
+              </a:spcAft>
+              <a:buSzPts val="1800"/>
+              <a:buChar char="●"/>
+            </a:pPr>
+            <a:r>
+              <a:rPr lang="fr"/>
+              <a:t>Confirm that user has been found in the database</a:t>
+            </a:r>
+            <a:endParaRPr/>
+          </a:p>
+          <a:p>
+            <a:pPr indent="-342900" lvl="0" marL="457200" rtl="0" algn="l">
+              <a:spcBef>
+                <a:spcPts val="0"/>
+              </a:spcBef>
+              <a:spcAft>
+                <a:spcPts val="0"/>
+              </a:spcAft>
+              <a:buSzPts val="1800"/>
+              <a:buChar char="●"/>
+            </a:pPr>
+            <a:r>
+              <a:rPr lang="fr"/>
+              <a:t>Same frequency (1 search at a time)</a:t>
+            </a:r>
+            <a:endParaRPr/>
+          </a:p>
+          <a:p>
+            <a:pPr indent="-342900" lvl="0" marL="457200" rtl="0" algn="l">
+              <a:spcBef>
+                <a:spcPts val="0"/>
+              </a:spcBef>
+              <a:spcAft>
+                <a:spcPts val="0"/>
+              </a:spcAft>
+              <a:buSzPts val="1800"/>
+              <a:buChar char="●"/>
+            </a:pPr>
+            <a:r>
+              <a:rPr lang="fr"/>
+              <a:t>Consistency is key</a:t>
+            </a:r>
+            <a:endParaRPr/>
+          </a:p>
+          <a:p>
+            <a:pPr indent="-342900" lvl="0" marL="457200" rtl="0" algn="l">
+              <a:spcBef>
+                <a:spcPts val="0"/>
+              </a:spcBef>
+              <a:spcAft>
+                <a:spcPts val="0"/>
+              </a:spcAft>
+              <a:buSzPts val="1800"/>
+              <a:buChar char="●"/>
+            </a:pPr>
+            <a:r>
+              <a:rPr lang="fr"/>
+              <a:t>No Mother Task Needed</a:t>
+            </a:r>
+            <a:endParaRPr/>
+          </a:p>
+          <a:p>
+            <a:pPr indent="0" lvl="0" marL="914400" rtl="0" algn="l">
+              <a:spcBef>
+                <a:spcPts val="1600"/>
+              </a:spcBef>
+              <a:spcAft>
+                <a:spcPts val="1600"/>
+              </a:spcAft>
+              <a:buNone/>
+            </a:pPr>
+            <a:r>
+              <a:t/>
+            </a:r>
+            <a:endParaRPr/>
+          </a:p>
+        </p:txBody>
+      </p:sp>
+    </p:spTree>
+  </p:cSld>
+  <p:clrMapOvr>
+    <a:masterClrMapping/>
+  </p:clrMapOvr>
+</p:sld>
+</file>
+
+<file path=ppt/slides/slide11.xml><?xml version="1.0" encoding="utf-8"?>
+<p:sld xmlns:a="http://schemas.openxmlformats.org/drawingml/2006/main" xmlns:r="http://schemas.openxmlformats.org/officeDocument/2006/relationships" xmlns:mc="http://schemas.openxmlformats.org/markup-compatibility/2006" xmlns:mv="urn:schemas-microsoft-com:mac:vml" xmlns:p="http://schemas.openxmlformats.org/presentationml/2006/main" xmlns:c="http://schemas.openxmlformats.org/drawingml/2006/chart" xmlns:dgm="http://schemas.openxmlformats.org/drawingml/2006/diagram" xmlns:o="urn:schemas-microsoft-com:office:office" xmlns:v="urn:schemas-microsoft-com:vml" xmlns:pvml="urn:schemas-microsoft-com:office:powerpoint" xmlns:com="http://schemas.openxmlformats.org/drawingml/2006/compatibility" xmlns:p14="http://schemas.microsoft.com/office/powerpoint/2010/main" xmlns:p15="http://schemas.microsoft.com/office/powerpoint/2012/main">
+  <p:cSld>
+    <p:spTree>
+      <p:nvGrpSpPr>
+        <p:cNvPr id="109" name="Shape 109"/>
+        <p:cNvGrpSpPr/>
+        <p:nvPr/>
+      </p:nvGrpSpPr>
+      <p:grpSpPr>
+        <a:xfrm>
+          <a:off x="0" y="0"/>
+          <a:ext cx="0" cy="0"/>
+          <a:chOff x="0" y="0"/>
+          <a:chExt cx="0" cy="0"/>
+        </a:xfrm>
+      </p:grpSpPr>
+      <p:sp>
+        <p:nvSpPr>
+          <p:cNvPr id="110" name="Google Shape;110;p23"/>
+          <p:cNvSpPr txBox="1"/>
+          <p:nvPr>
+            <p:ph type="title"/>
+          </p:nvPr>
+        </p:nvSpPr>
+        <p:spPr>
+          <a:xfrm>
+            <a:off x="311700" y="-88375"/>
+            <a:ext cx="8520600" cy="572700"/>
+          </a:xfrm>
+          <a:prstGeom prst="rect">
+            <a:avLst/>
+          </a:prstGeom>
+        </p:spPr>
+        <p:txBody>
+          <a:bodyPr anchorCtr="0" anchor="t" bIns="91425" lIns="91425" spcFirstLastPara="1" rIns="91425" wrap="square" tIns="91425">
+            <a:noAutofit/>
+          </a:bodyPr>
+          <a:lstStyle/>
+          <a:p>
+            <a:pPr indent="0" lvl="0" marL="0" rtl="0" algn="l">
+              <a:spcBef>
+                <a:spcPts val="0"/>
+              </a:spcBef>
+              <a:spcAft>
+                <a:spcPts val="0"/>
+              </a:spcAft>
+              <a:buClr>
+                <a:schemeClr val="dk1"/>
+              </a:buClr>
+              <a:buSzPts val="1100"/>
+              <a:buFont typeface="Arial"/>
+              <a:buNone/>
+            </a:pPr>
+            <a:r>
+              <a:rPr lang="fr"/>
+              <a:t>Abstract Code - </a:t>
+            </a:r>
+            <a:r>
+              <a:rPr lang="fr"/>
+              <a:t>Care provider </a:t>
+            </a:r>
+            <a:r>
+              <a:rPr lang="fr"/>
+              <a:t>login</a:t>
+            </a:r>
+            <a:endParaRPr/>
+          </a:p>
+          <a:p>
+            <a:pPr indent="0" lvl="0" marL="0" rtl="0" algn="l">
+              <a:spcBef>
+                <a:spcPts val="0"/>
+              </a:spcBef>
+              <a:spcAft>
+                <a:spcPts val="0"/>
+              </a:spcAft>
+              <a:buNone/>
+            </a:pPr>
+            <a:r>
+              <a:t/>
+            </a:r>
+            <a:endParaRPr/>
+          </a:p>
+        </p:txBody>
+      </p:sp>
+      <p:sp>
+        <p:nvSpPr>
+          <p:cNvPr id="111" name="Google Shape;111;p23"/>
+          <p:cNvSpPr txBox="1"/>
+          <p:nvPr>
+            <p:ph idx="1" type="body"/>
+          </p:nvPr>
+        </p:nvSpPr>
+        <p:spPr>
+          <a:xfrm>
+            <a:off x="311700" y="390475"/>
+            <a:ext cx="8520600" cy="4570200"/>
+          </a:xfrm>
+          <a:prstGeom prst="rect">
+            <a:avLst/>
+          </a:prstGeom>
+        </p:spPr>
+        <p:txBody>
+          <a:bodyPr anchorCtr="0" anchor="t" bIns="91425" lIns="91425" spcFirstLastPara="1" rIns="91425" wrap="square" tIns="91425">
+            <a:noAutofit/>
+          </a:bodyPr>
+          <a:lstStyle/>
+          <a:p>
+            <a:pPr indent="0" lvl="0" marL="0" rtl="0" algn="l">
+              <a:spcBef>
+                <a:spcPts val="0"/>
+              </a:spcBef>
+              <a:spcAft>
+                <a:spcPts val="0"/>
+              </a:spcAft>
+              <a:buNone/>
+            </a:pPr>
+            <a:r>
+              <a:rPr b="1" lang="fr" u="sng"/>
+              <a:t>Abstract Code</a:t>
+            </a:r>
+            <a:endParaRPr b="1" u="sng"/>
+          </a:p>
+          <a:p>
+            <a:pPr indent="-342900" lvl="0" marL="457200" rtl="0" algn="l">
+              <a:spcBef>
+                <a:spcPts val="1600"/>
+              </a:spcBef>
+              <a:spcAft>
+                <a:spcPts val="0"/>
+              </a:spcAft>
+              <a:buSzPts val="1800"/>
+              <a:buChar char="●"/>
+            </a:pPr>
+            <a:r>
+              <a:rPr lang="fr"/>
+              <a:t>User enters </a:t>
+            </a:r>
+            <a:r>
+              <a:rPr b="1" lang="fr"/>
+              <a:t>username </a:t>
+            </a:r>
+            <a:r>
+              <a:rPr lang="fr"/>
+              <a:t>/ </a:t>
+            </a:r>
+            <a:r>
+              <a:rPr b="1" lang="fr"/>
+              <a:t>password </a:t>
+            </a:r>
+            <a:r>
+              <a:rPr lang="fr"/>
+              <a:t>input fields. </a:t>
+            </a:r>
+            <a:endParaRPr/>
+          </a:p>
+          <a:p>
+            <a:pPr indent="-342900" lvl="0" marL="457200" rtl="0" algn="l">
+              <a:spcBef>
+                <a:spcPts val="0"/>
+              </a:spcBef>
+              <a:spcAft>
+                <a:spcPts val="0"/>
+              </a:spcAft>
+              <a:buSzPts val="1800"/>
+              <a:buChar char="●"/>
+            </a:pPr>
+            <a:r>
+              <a:rPr lang="fr"/>
+              <a:t>IF input field NOT empty AND do not contain any invalid characters THEN:</a:t>
+            </a:r>
+            <a:endParaRPr/>
+          </a:p>
+          <a:p>
+            <a:pPr indent="-342900" lvl="1" marL="914400" rtl="0" algn="l">
+              <a:spcBef>
+                <a:spcPts val="0"/>
+              </a:spcBef>
+              <a:spcAft>
+                <a:spcPts val="0"/>
+              </a:spcAft>
+              <a:buSzPts val="1800"/>
+              <a:buChar char="○"/>
+            </a:pPr>
+            <a:r>
+              <a:rPr lang="fr" sz="1800"/>
+              <a:t>When </a:t>
+            </a:r>
+            <a:r>
+              <a:rPr b="1" lang="fr" sz="1800"/>
+              <a:t>LOGIN </a:t>
+            </a:r>
+            <a:r>
+              <a:rPr lang="fr" sz="1800"/>
+              <a:t>button is clicked:</a:t>
+            </a:r>
+            <a:endParaRPr sz="1800"/>
+          </a:p>
+          <a:p>
+            <a:pPr indent="-342900" lvl="2" marL="1371600" rtl="0" algn="l">
+              <a:spcBef>
+                <a:spcPts val="0"/>
+              </a:spcBef>
+              <a:spcAft>
+                <a:spcPts val="0"/>
+              </a:spcAft>
+              <a:buSzPts val="1800"/>
+              <a:buChar char="■"/>
+            </a:pPr>
+            <a:r>
+              <a:rPr lang="fr" sz="1800"/>
+              <a:t>IF </a:t>
+            </a:r>
+            <a:r>
+              <a:rPr b="1" lang="fr" sz="1800"/>
+              <a:t>username </a:t>
+            </a:r>
+            <a:r>
+              <a:rPr lang="fr" sz="1800"/>
+              <a:t>/ hashed </a:t>
+            </a:r>
+            <a:r>
+              <a:rPr b="1" lang="fr" sz="1800"/>
+              <a:t>password </a:t>
+            </a:r>
+            <a:r>
+              <a:rPr lang="fr" sz="1800"/>
+              <a:t>found then:</a:t>
+            </a:r>
+            <a:endParaRPr sz="1800"/>
+          </a:p>
+          <a:p>
+            <a:pPr indent="-342900" lvl="3" marL="1828800" rtl="0" algn="l">
+              <a:spcBef>
+                <a:spcPts val="0"/>
+              </a:spcBef>
+              <a:spcAft>
+                <a:spcPts val="0"/>
+              </a:spcAft>
+              <a:buSzPts val="1800"/>
+              <a:buChar char="●"/>
+            </a:pPr>
+            <a:r>
+              <a:rPr lang="fr" sz="1800"/>
+              <a:t>Redirect to </a:t>
+            </a:r>
+            <a:r>
+              <a:rPr b="1" lang="fr" sz="1800"/>
+              <a:t>home </a:t>
+            </a:r>
+            <a:r>
+              <a:rPr lang="fr" sz="1800"/>
+              <a:t>page</a:t>
+            </a:r>
+            <a:endParaRPr sz="1800"/>
+          </a:p>
+          <a:p>
+            <a:pPr indent="-342900" lvl="2" marL="1371600" rtl="0" algn="l">
+              <a:spcBef>
+                <a:spcPts val="0"/>
+              </a:spcBef>
+              <a:spcAft>
+                <a:spcPts val="0"/>
+              </a:spcAft>
+              <a:buSzPts val="1800"/>
+              <a:buChar char="■"/>
+            </a:pPr>
+            <a:r>
+              <a:rPr lang="fr" sz="1800"/>
+              <a:t>ELSE </a:t>
+            </a:r>
+            <a:endParaRPr sz="1800"/>
+          </a:p>
+          <a:p>
+            <a:pPr indent="-342900" lvl="3" marL="1828800" rtl="0" algn="l">
+              <a:spcBef>
+                <a:spcPts val="0"/>
+              </a:spcBef>
+              <a:spcAft>
+                <a:spcPts val="0"/>
+              </a:spcAft>
+              <a:buSzPts val="1800"/>
+              <a:buChar char="●"/>
+            </a:pPr>
+            <a:r>
+              <a:rPr lang="fr" sz="1800"/>
+              <a:t>Go back to login form with error message</a:t>
+            </a:r>
+            <a:endParaRPr sz="1800"/>
+          </a:p>
+          <a:p>
+            <a:pPr indent="-342900" lvl="1" marL="914400" rtl="0" algn="l">
+              <a:spcBef>
+                <a:spcPts val="0"/>
+              </a:spcBef>
+              <a:spcAft>
+                <a:spcPts val="0"/>
+              </a:spcAft>
+              <a:buSzPts val="1800"/>
+              <a:buChar char="○"/>
+            </a:pPr>
+            <a:r>
+              <a:rPr lang="fr" sz="1800"/>
+              <a:t>Go to </a:t>
+            </a:r>
+            <a:r>
+              <a:rPr b="1" lang="fr" sz="1800"/>
+              <a:t>home </a:t>
+            </a:r>
+            <a:r>
+              <a:rPr lang="fr" sz="1800"/>
+              <a:t>page</a:t>
+            </a:r>
+            <a:endParaRPr sz="1800"/>
+          </a:p>
+          <a:p>
+            <a:pPr indent="-342900" lvl="0" marL="457200" rtl="0" algn="l">
+              <a:spcBef>
+                <a:spcPts val="0"/>
+              </a:spcBef>
+              <a:spcAft>
+                <a:spcPts val="0"/>
+              </a:spcAft>
+              <a:buSzPts val="1800"/>
+              <a:buChar char="●"/>
+            </a:pPr>
+            <a:r>
+              <a:rPr lang="fr"/>
+              <a:t>ELSE field values are invalid, display </a:t>
+            </a:r>
+            <a:r>
+              <a:rPr b="1" lang="fr"/>
+              <a:t>login </a:t>
+            </a:r>
+            <a:r>
+              <a:rPr lang="fr"/>
+              <a:t>form with error message</a:t>
+            </a:r>
+            <a:endParaRPr sz="1800"/>
+          </a:p>
+          <a:p>
+            <a:pPr indent="0" lvl="0" marL="1371600" rtl="0" algn="l">
+              <a:spcBef>
+                <a:spcPts val="1600"/>
+              </a:spcBef>
+              <a:spcAft>
+                <a:spcPts val="0"/>
+              </a:spcAft>
+              <a:buNone/>
+            </a:pPr>
+            <a:r>
+              <a:t/>
+            </a:r>
+            <a:endParaRPr sz="1800"/>
+          </a:p>
+          <a:p>
+            <a:pPr indent="0" lvl="0" marL="457200" rtl="0" algn="l">
+              <a:spcBef>
+                <a:spcPts val="1600"/>
+              </a:spcBef>
+              <a:spcAft>
+                <a:spcPts val="0"/>
+              </a:spcAft>
+              <a:buNone/>
+            </a:pPr>
+            <a:r>
+              <a:t/>
+            </a:r>
+            <a:endParaRPr b="1" u="sng"/>
+          </a:p>
+          <a:p>
+            <a:pPr indent="0" lvl="0" marL="914400" rtl="0" algn="l">
+              <a:spcBef>
+                <a:spcPts val="1600"/>
+              </a:spcBef>
+              <a:spcAft>
+                <a:spcPts val="1600"/>
+              </a:spcAft>
+              <a:buNone/>
+            </a:pPr>
+            <a:r>
+              <a:t/>
+            </a:r>
+            <a:endParaRPr/>
+          </a:p>
+        </p:txBody>
+      </p:sp>
+    </p:spTree>
+  </p:cSld>
+  <p:clrMapOvr>
+    <a:masterClrMapping/>
+  </p:clrMapOvr>
+</p:sld>
+</file>
+
+<file path=ppt/slides/slide12.xml><?xml version="1.0" encoding="utf-8"?>
+<p:sld xmlns:a="http://schemas.openxmlformats.org/drawingml/2006/main" xmlns:r="http://schemas.openxmlformats.org/officeDocument/2006/relationships" xmlns:mc="http://schemas.openxmlformats.org/markup-compatibility/2006" xmlns:mv="urn:schemas-microsoft-com:mac:vml" xmlns:p="http://schemas.openxmlformats.org/presentationml/2006/main" xmlns:c="http://schemas.openxmlformats.org/drawingml/2006/chart" xmlns:dgm="http://schemas.openxmlformats.org/drawingml/2006/diagram" xmlns:o="urn:schemas-microsoft-com:office:office" xmlns:v="urn:schemas-microsoft-com:vml" xmlns:pvml="urn:schemas-microsoft-com:office:powerpoint" xmlns:com="http://schemas.openxmlformats.org/drawingml/2006/compatibility" xmlns:p14="http://schemas.microsoft.com/office/powerpoint/2010/main" xmlns:p15="http://schemas.microsoft.com/office/powerpoint/2012/main">
+  <p:cSld>
+    <p:spTree>
+      <p:nvGrpSpPr>
+        <p:cNvPr id="115" name="Shape 115"/>
+        <p:cNvGrpSpPr/>
+        <p:nvPr/>
+      </p:nvGrpSpPr>
+      <p:grpSpPr>
+        <a:xfrm>
+          <a:off x="0" y="0"/>
+          <a:ext cx="0" cy="0"/>
+          <a:chOff x="0" y="0"/>
+          <a:chExt cx="0" cy="0"/>
+        </a:xfrm>
+      </p:grpSpPr>
+      <p:sp>
+        <p:nvSpPr>
+          <p:cNvPr id="116" name="Google Shape;116;p24"/>
+          <p:cNvSpPr txBox="1"/>
+          <p:nvPr>
+            <p:ph idx="1" type="body"/>
+          </p:nvPr>
+        </p:nvSpPr>
+        <p:spPr>
+          <a:xfrm>
+            <a:off x="311700" y="619075"/>
+            <a:ext cx="8520600" cy="3416400"/>
+          </a:xfrm>
+          <a:prstGeom prst="rect">
+            <a:avLst/>
+          </a:prstGeom>
+        </p:spPr>
+        <p:txBody>
+          <a:bodyPr anchorCtr="0" anchor="ctr" bIns="91425" lIns="91425" spcFirstLastPara="1" rIns="91425" wrap="square" tIns="91425">
+            <a:noAutofit/>
+          </a:bodyPr>
+          <a:lstStyle/>
+          <a:p>
+            <a:pPr indent="-381000" lvl="0" marL="457200" rtl="0" algn="ctr">
+              <a:spcBef>
+                <a:spcPts val="0"/>
+              </a:spcBef>
+              <a:spcAft>
+                <a:spcPts val="0"/>
+              </a:spcAft>
+              <a:buSzPts val="2400"/>
+              <a:buAutoNum type="arabicPeriod" startAt="5"/>
+            </a:pPr>
+            <a:r>
+              <a:rPr b="1" lang="fr" sz="2400"/>
+              <a:t>Patient profile lookup</a:t>
+            </a:r>
+            <a:endParaRPr b="1" sz="2400"/>
+          </a:p>
+        </p:txBody>
+      </p:sp>
+    </p:spTree>
+  </p:cSld>
+  <p:clrMapOvr>
+    <a:masterClrMapping/>
+  </p:clrMapOvr>
+</p:sld>
+</file>
+
+<file path=ppt/slides/slide13.xml><?xml version="1.0" encoding="utf-8"?>
+<p:sld xmlns:a="http://schemas.openxmlformats.org/drawingml/2006/main" xmlns:r="http://schemas.openxmlformats.org/officeDocument/2006/relationships" xmlns:mc="http://schemas.openxmlformats.org/markup-compatibility/2006" xmlns:mv="urn:schemas-microsoft-com:mac:vml" xmlns:p="http://schemas.openxmlformats.org/presentationml/2006/main" xmlns:c="http://schemas.openxmlformats.org/drawingml/2006/chart" xmlns:dgm="http://schemas.openxmlformats.org/drawingml/2006/diagram" xmlns:o="urn:schemas-microsoft-com:office:office" xmlns:v="urn:schemas-microsoft-com:vml" xmlns:pvml="urn:schemas-microsoft-com:office:powerpoint" xmlns:com="http://schemas.openxmlformats.org/drawingml/2006/compatibility" xmlns:p14="http://schemas.microsoft.com/office/powerpoint/2010/main" xmlns:p15="http://schemas.microsoft.com/office/powerpoint/2012/main">
+  <p:cSld>
+    <p:spTree>
+      <p:nvGrpSpPr>
+        <p:cNvPr id="120" name="Shape 120"/>
+        <p:cNvGrpSpPr/>
+        <p:nvPr/>
+      </p:nvGrpSpPr>
+      <p:grpSpPr>
+        <a:xfrm>
+          <a:off x="0" y="0"/>
+          <a:ext cx="0" cy="0"/>
+          <a:chOff x="0" y="0"/>
+          <a:chExt cx="0" cy="0"/>
+        </a:xfrm>
+      </p:grpSpPr>
+      <p:sp>
+        <p:nvSpPr>
+          <p:cNvPr id="121" name="Google Shape;121;p25"/>
+          <p:cNvSpPr txBox="1"/>
+          <p:nvPr>
+            <p:ph type="title"/>
+          </p:nvPr>
+        </p:nvSpPr>
+        <p:spPr>
+          <a:xfrm>
+            <a:off x="311700" y="-88375"/>
+            <a:ext cx="8520600" cy="572700"/>
+          </a:xfrm>
+          <a:prstGeom prst="rect">
+            <a:avLst/>
+          </a:prstGeom>
+        </p:spPr>
+        <p:txBody>
+          <a:bodyPr anchorCtr="0" anchor="t" bIns="91425" lIns="91425" spcFirstLastPara="1" rIns="91425" wrap="square" tIns="91425">
+            <a:noAutofit/>
+          </a:bodyPr>
+          <a:lstStyle/>
+          <a:p>
+            <a:pPr indent="0" lvl="0" marL="0" rtl="0" algn="l">
+              <a:spcBef>
+                <a:spcPts val="0"/>
+              </a:spcBef>
+              <a:spcAft>
+                <a:spcPts val="0"/>
+              </a:spcAft>
+              <a:buNone/>
+            </a:pPr>
+            <a:r>
+              <a:rPr lang="fr"/>
+              <a:t>Abstract Code - </a:t>
+            </a:r>
+            <a:r>
+              <a:rPr lang="fr"/>
+              <a:t>Patient profile lookup</a:t>
+            </a:r>
+            <a:endParaRPr/>
+          </a:p>
+        </p:txBody>
+      </p:sp>
+      <p:sp>
+        <p:nvSpPr>
+          <p:cNvPr id="122" name="Google Shape;122;p25"/>
+          <p:cNvSpPr txBox="1"/>
+          <p:nvPr>
+            <p:ph idx="1" type="body"/>
+          </p:nvPr>
+        </p:nvSpPr>
+        <p:spPr>
+          <a:xfrm>
+            <a:off x="311700" y="390475"/>
+            <a:ext cx="8520600" cy="4570200"/>
+          </a:xfrm>
+          <a:prstGeom prst="rect">
+            <a:avLst/>
+          </a:prstGeom>
+        </p:spPr>
+        <p:txBody>
+          <a:bodyPr anchorCtr="0" anchor="t" bIns="91425" lIns="91425" spcFirstLastPara="1" rIns="91425" wrap="square" tIns="91425">
+            <a:noAutofit/>
+          </a:bodyPr>
+          <a:lstStyle/>
+          <a:p>
+            <a:pPr indent="0" lvl="0" marL="0" rtl="0" algn="l">
+              <a:spcBef>
+                <a:spcPts val="0"/>
+              </a:spcBef>
+              <a:spcAft>
+                <a:spcPts val="0"/>
+              </a:spcAft>
+              <a:buNone/>
+            </a:pPr>
+            <a:r>
+              <a:rPr b="1" lang="fr" u="sng"/>
+              <a:t>Task d</a:t>
+            </a:r>
+            <a:r>
+              <a:rPr b="1" lang="fr" u="sng"/>
+              <a:t>ecomposition flow</a:t>
+            </a:r>
+            <a:endParaRPr b="1" u="sng"/>
+          </a:p>
+          <a:p>
+            <a:pPr indent="-342900" lvl="0" marL="457200" rtl="0" algn="l">
+              <a:spcBef>
+                <a:spcPts val="1600"/>
+              </a:spcBef>
+              <a:spcAft>
+                <a:spcPts val="0"/>
+              </a:spcAft>
+              <a:buSzPts val="1800"/>
+              <a:buChar char="●"/>
+            </a:pPr>
+            <a:r>
+              <a:rPr lang="fr"/>
+              <a:t>Lookup the database to verify whether patient exists (based on </a:t>
+            </a:r>
+            <a:r>
+              <a:rPr lang="fr"/>
+              <a:t>HealthCardNr</a:t>
+            </a:r>
+            <a:r>
+              <a:rPr lang="fr"/>
+              <a:t>)</a:t>
+            </a:r>
+            <a:endParaRPr/>
+          </a:p>
+          <a:p>
+            <a:pPr indent="-342900" lvl="0" marL="457200" rtl="0" algn="l">
+              <a:spcBef>
+                <a:spcPts val="0"/>
+              </a:spcBef>
+              <a:spcAft>
+                <a:spcPts val="0"/>
+              </a:spcAft>
+              <a:buSzPts val="1800"/>
+              <a:buChar char="●"/>
+            </a:pPr>
+            <a:r>
+              <a:rPr lang="fr"/>
+              <a:t>Requires HealthCardNr</a:t>
+            </a:r>
+            <a:endParaRPr/>
+          </a:p>
+          <a:p>
+            <a:pPr indent="-342900" lvl="0" marL="457200" rtl="0" algn="l">
+              <a:spcBef>
+                <a:spcPts val="0"/>
+              </a:spcBef>
+              <a:spcAft>
+                <a:spcPts val="0"/>
+              </a:spcAft>
+              <a:buSzPts val="1800"/>
+              <a:buChar char="●"/>
+            </a:pPr>
+            <a:r>
+              <a:rPr lang="fr"/>
+              <a:t>Confirm that user has been found in the database</a:t>
+            </a:r>
+            <a:endParaRPr/>
+          </a:p>
+          <a:p>
+            <a:pPr indent="-342900" lvl="0" marL="457200" rtl="0" algn="l">
+              <a:spcBef>
+                <a:spcPts val="0"/>
+              </a:spcBef>
+              <a:spcAft>
+                <a:spcPts val="0"/>
+              </a:spcAft>
+              <a:buSzPts val="1800"/>
+              <a:buChar char="●"/>
+            </a:pPr>
+            <a:r>
+              <a:rPr lang="fr"/>
+              <a:t>Same frequency (1 search at a time)</a:t>
+            </a:r>
+            <a:endParaRPr/>
+          </a:p>
+          <a:p>
+            <a:pPr indent="-342900" lvl="0" marL="457200" rtl="0" algn="l">
+              <a:spcBef>
+                <a:spcPts val="0"/>
+              </a:spcBef>
+              <a:spcAft>
+                <a:spcPts val="0"/>
+              </a:spcAft>
+              <a:buSzPts val="1800"/>
+              <a:buChar char="●"/>
+            </a:pPr>
+            <a:r>
+              <a:rPr lang="fr"/>
+              <a:t>Consistency is key</a:t>
+            </a:r>
+            <a:endParaRPr/>
+          </a:p>
+          <a:p>
+            <a:pPr indent="-342900" lvl="0" marL="457200" rtl="0" algn="l">
+              <a:spcBef>
+                <a:spcPts val="0"/>
+              </a:spcBef>
+              <a:spcAft>
+                <a:spcPts val="0"/>
+              </a:spcAft>
+              <a:buSzPts val="1800"/>
+              <a:buChar char="●"/>
+            </a:pPr>
+            <a:r>
+              <a:rPr lang="fr"/>
+              <a:t>No Mother Task Needed</a:t>
+            </a:r>
+            <a:endParaRPr/>
+          </a:p>
+          <a:p>
+            <a:pPr indent="0" lvl="0" marL="914400" rtl="0" algn="l">
+              <a:spcBef>
+                <a:spcPts val="1600"/>
+              </a:spcBef>
+              <a:spcAft>
+                <a:spcPts val="1600"/>
+              </a:spcAft>
+              <a:buNone/>
+            </a:pPr>
+            <a:r>
+              <a:t/>
+            </a:r>
+            <a:endParaRPr/>
+          </a:p>
+        </p:txBody>
+      </p:sp>
+    </p:spTree>
+  </p:cSld>
+  <p:clrMapOvr>
+    <a:masterClrMapping/>
+  </p:clrMapOvr>
+</p:sld>
+</file>
+
+<file path=ppt/slides/slide14.xml><?xml version="1.0" encoding="utf-8"?>
+<p:sld xmlns:a="http://schemas.openxmlformats.org/drawingml/2006/main" xmlns:r="http://schemas.openxmlformats.org/officeDocument/2006/relationships" xmlns:mc="http://schemas.openxmlformats.org/markup-compatibility/2006" xmlns:mv="urn:schemas-microsoft-com:mac:vml" xmlns:p="http://schemas.openxmlformats.org/presentationml/2006/main" xmlns:c="http://schemas.openxmlformats.org/drawingml/2006/chart" xmlns:dgm="http://schemas.openxmlformats.org/drawingml/2006/diagram" xmlns:o="urn:schemas-microsoft-com:office:office" xmlns:v="urn:schemas-microsoft-com:vml" xmlns:pvml="urn:schemas-microsoft-com:office:powerpoint" xmlns:com="http://schemas.openxmlformats.org/drawingml/2006/compatibility" xmlns:p14="http://schemas.microsoft.com/office/powerpoint/2010/main" xmlns:p15="http://schemas.microsoft.com/office/powerpoint/2012/main">
+  <p:cSld>
+    <p:spTree>
+      <p:nvGrpSpPr>
+        <p:cNvPr id="126" name="Shape 126"/>
+        <p:cNvGrpSpPr/>
+        <p:nvPr/>
+      </p:nvGrpSpPr>
+      <p:grpSpPr>
+        <a:xfrm>
+          <a:off x="0" y="0"/>
+          <a:ext cx="0" cy="0"/>
+          <a:chOff x="0" y="0"/>
+          <a:chExt cx="0" cy="0"/>
+        </a:xfrm>
+      </p:grpSpPr>
+      <p:sp>
+        <p:nvSpPr>
+          <p:cNvPr id="127" name="Google Shape;127;p26"/>
+          <p:cNvSpPr txBox="1"/>
+          <p:nvPr>
+            <p:ph type="title"/>
+          </p:nvPr>
+        </p:nvSpPr>
+        <p:spPr>
+          <a:xfrm>
+            <a:off x="311700" y="-88375"/>
+            <a:ext cx="8520600" cy="572700"/>
+          </a:xfrm>
+          <a:prstGeom prst="rect">
+            <a:avLst/>
+          </a:prstGeom>
+        </p:spPr>
+        <p:txBody>
+          <a:bodyPr anchorCtr="0" anchor="t" bIns="91425" lIns="91425" spcFirstLastPara="1" rIns="91425" wrap="square" tIns="91425">
+            <a:noAutofit/>
+          </a:bodyPr>
+          <a:lstStyle/>
+          <a:p>
+            <a:pPr indent="0" lvl="0" marL="0" rtl="0" algn="l">
+              <a:spcBef>
+                <a:spcPts val="0"/>
+              </a:spcBef>
+              <a:spcAft>
+                <a:spcPts val="0"/>
+              </a:spcAft>
+              <a:buClr>
+                <a:schemeClr val="dk1"/>
+              </a:buClr>
+              <a:buSzPts val="1100"/>
+              <a:buFont typeface="Arial"/>
+              <a:buNone/>
+            </a:pPr>
+            <a:r>
+              <a:rPr lang="fr"/>
+              <a:t>Abstract Code - Patient profile lookup</a:t>
+            </a:r>
+            <a:endParaRPr/>
+          </a:p>
+          <a:p>
+            <a:pPr indent="0" lvl="0" marL="0" rtl="0" algn="l">
+              <a:spcBef>
+                <a:spcPts val="0"/>
+              </a:spcBef>
+              <a:spcAft>
+                <a:spcPts val="0"/>
+              </a:spcAft>
+              <a:buNone/>
+            </a:pPr>
+            <a:r>
+              <a:t/>
+            </a:r>
+            <a:endParaRPr/>
+          </a:p>
+        </p:txBody>
+      </p:sp>
+      <p:sp>
+        <p:nvSpPr>
+          <p:cNvPr id="128" name="Google Shape;128;p26"/>
+          <p:cNvSpPr txBox="1"/>
+          <p:nvPr>
+            <p:ph idx="1" type="body"/>
+          </p:nvPr>
+        </p:nvSpPr>
+        <p:spPr>
+          <a:xfrm>
+            <a:off x="311700" y="390475"/>
+            <a:ext cx="8520600" cy="4570200"/>
+          </a:xfrm>
+          <a:prstGeom prst="rect">
+            <a:avLst/>
+          </a:prstGeom>
+        </p:spPr>
+        <p:txBody>
+          <a:bodyPr anchorCtr="0" anchor="t" bIns="91425" lIns="91425" spcFirstLastPara="1" rIns="91425" wrap="square" tIns="91425">
+            <a:noAutofit/>
+          </a:bodyPr>
+          <a:lstStyle/>
+          <a:p>
+            <a:pPr indent="0" lvl="0" marL="0" rtl="0" algn="l">
+              <a:spcBef>
+                <a:spcPts val="0"/>
+              </a:spcBef>
+              <a:spcAft>
+                <a:spcPts val="0"/>
+              </a:spcAft>
+              <a:buNone/>
+            </a:pPr>
+            <a:r>
+              <a:rPr b="1" lang="fr" u="sng"/>
+              <a:t>Abstract Code</a:t>
+            </a:r>
+            <a:endParaRPr b="1" u="sng"/>
+          </a:p>
+          <a:p>
+            <a:pPr indent="-342900" lvl="0" marL="457200" rtl="0" algn="l">
+              <a:spcBef>
+                <a:spcPts val="1600"/>
+              </a:spcBef>
+              <a:spcAft>
+                <a:spcPts val="0"/>
+              </a:spcAft>
+              <a:buSzPts val="1800"/>
+              <a:buChar char="●"/>
+            </a:pPr>
+            <a:r>
+              <a:rPr lang="fr"/>
+              <a:t>User enters HealthCardNr input field. </a:t>
+            </a:r>
+            <a:endParaRPr/>
+          </a:p>
+          <a:p>
+            <a:pPr indent="-342900" lvl="0" marL="457200" rtl="0" algn="l">
+              <a:spcBef>
+                <a:spcPts val="0"/>
+              </a:spcBef>
+              <a:spcAft>
+                <a:spcPts val="0"/>
+              </a:spcAft>
+              <a:buSzPts val="1800"/>
+              <a:buChar char="●"/>
+            </a:pPr>
+            <a:r>
+              <a:rPr lang="fr"/>
+              <a:t>IF input field NOT empty AND do not contain any invalid characters THEN:</a:t>
+            </a:r>
+            <a:endParaRPr/>
+          </a:p>
+          <a:p>
+            <a:pPr indent="-342900" lvl="1" marL="914400" rtl="0" algn="l">
+              <a:spcBef>
+                <a:spcPts val="0"/>
+              </a:spcBef>
+              <a:spcAft>
+                <a:spcPts val="0"/>
+              </a:spcAft>
+              <a:buSzPts val="1800"/>
+              <a:buChar char="○"/>
+            </a:pPr>
+            <a:r>
+              <a:rPr lang="fr" sz="1800"/>
+              <a:t>When SEARCH button is clicked:</a:t>
+            </a:r>
+            <a:endParaRPr sz="1800"/>
+          </a:p>
+          <a:p>
+            <a:pPr indent="-342900" lvl="2" marL="1371600" rtl="0" algn="l">
+              <a:spcBef>
+                <a:spcPts val="0"/>
+              </a:spcBef>
+              <a:spcAft>
+                <a:spcPts val="0"/>
+              </a:spcAft>
+              <a:buSzPts val="1800"/>
+              <a:buChar char="■"/>
+            </a:pPr>
+            <a:r>
+              <a:rPr lang="fr" sz="1800"/>
+              <a:t>IF HealthCardNr is found then:</a:t>
+            </a:r>
+            <a:endParaRPr sz="1800"/>
+          </a:p>
+          <a:p>
+            <a:pPr indent="-342900" lvl="3" marL="1828800" rtl="0" algn="l">
+              <a:spcBef>
+                <a:spcPts val="0"/>
+              </a:spcBef>
+              <a:spcAft>
+                <a:spcPts val="0"/>
+              </a:spcAft>
+              <a:buSzPts val="1800"/>
+              <a:buChar char="●"/>
+            </a:pPr>
+            <a:r>
+              <a:rPr lang="fr" sz="1800"/>
+              <a:t>Redirect to patient profile page</a:t>
+            </a:r>
+            <a:endParaRPr sz="1800"/>
+          </a:p>
+          <a:p>
+            <a:pPr indent="-342900" lvl="2" marL="1371600" rtl="0" algn="l">
+              <a:spcBef>
+                <a:spcPts val="0"/>
+              </a:spcBef>
+              <a:spcAft>
+                <a:spcPts val="0"/>
+              </a:spcAft>
+              <a:buSzPts val="1800"/>
+              <a:buChar char="■"/>
+            </a:pPr>
+            <a:r>
+              <a:rPr lang="fr" sz="1800"/>
+              <a:t>ELSE </a:t>
+            </a:r>
+            <a:endParaRPr sz="1800"/>
+          </a:p>
+          <a:p>
+            <a:pPr indent="-342900" lvl="3" marL="1828800" rtl="0" algn="l">
+              <a:spcBef>
+                <a:spcPts val="0"/>
+              </a:spcBef>
+              <a:spcAft>
+                <a:spcPts val="0"/>
+              </a:spcAft>
+              <a:buSzPts val="1800"/>
+              <a:buChar char="●"/>
+            </a:pPr>
+            <a:r>
+              <a:rPr lang="fr" sz="1800"/>
+              <a:t>G</a:t>
+            </a:r>
+            <a:r>
+              <a:rPr lang="fr" sz="1800"/>
+              <a:t>o back to search form with error message</a:t>
+            </a:r>
+            <a:endParaRPr sz="1800"/>
+          </a:p>
+          <a:p>
+            <a:pPr indent="-342900" lvl="1" marL="914400" rtl="0" algn="l">
+              <a:spcBef>
+                <a:spcPts val="0"/>
+              </a:spcBef>
+              <a:spcAft>
+                <a:spcPts val="0"/>
+              </a:spcAft>
+              <a:buSzPts val="1800"/>
+              <a:buChar char="○"/>
+            </a:pPr>
+            <a:r>
+              <a:rPr lang="fr" sz="1800"/>
+              <a:t>Go to profile page</a:t>
+            </a:r>
+            <a:endParaRPr sz="1800"/>
+          </a:p>
+          <a:p>
+            <a:pPr indent="-342900" lvl="0" marL="457200" rtl="0" algn="l">
+              <a:spcBef>
+                <a:spcPts val="0"/>
+              </a:spcBef>
+              <a:spcAft>
+                <a:spcPts val="0"/>
+              </a:spcAft>
+              <a:buSzPts val="1800"/>
+              <a:buChar char="●"/>
+            </a:pPr>
+            <a:r>
+              <a:rPr lang="fr"/>
+              <a:t>ELSE field values are invalid, display search form with error message</a:t>
+            </a:r>
+            <a:endParaRPr sz="1800"/>
+          </a:p>
+          <a:p>
+            <a:pPr indent="0" lvl="0" marL="1371600" rtl="0" algn="l">
+              <a:spcBef>
+                <a:spcPts val="1600"/>
+              </a:spcBef>
+              <a:spcAft>
+                <a:spcPts val="0"/>
+              </a:spcAft>
+              <a:buNone/>
+            </a:pPr>
+            <a:r>
+              <a:t/>
+            </a:r>
+            <a:endParaRPr sz="1800"/>
+          </a:p>
+          <a:p>
+            <a:pPr indent="0" lvl="0" marL="457200" rtl="0" algn="l">
+              <a:spcBef>
+                <a:spcPts val="1600"/>
+              </a:spcBef>
+              <a:spcAft>
+                <a:spcPts val="0"/>
+              </a:spcAft>
+              <a:buNone/>
+            </a:pPr>
+            <a:r>
+              <a:t/>
+            </a:r>
+            <a:endParaRPr b="1" u="sng"/>
+          </a:p>
+          <a:p>
+            <a:pPr indent="0" lvl="0" marL="914400" rtl="0" algn="l">
+              <a:spcBef>
+                <a:spcPts val="1600"/>
+              </a:spcBef>
+              <a:spcAft>
+                <a:spcPts val="1600"/>
+              </a:spcAft>
+              <a:buNone/>
+            </a:pPr>
+            <a:r>
+              <a:t/>
+            </a:r>
+            <a:endParaRPr/>
+          </a:p>
+        </p:txBody>
+      </p:sp>
+    </p:spTree>
+  </p:cSld>
+  <p:clrMapOvr>
+    <a:masterClrMapping/>
+  </p:clrMapOvr>
+</p:sld>
+</file>
+
+<file path=ppt/slides/slide15.xml><?xml version="1.0" encoding="utf-8"?>
+<p:sld xmlns:a="http://schemas.openxmlformats.org/drawingml/2006/main" xmlns:r="http://schemas.openxmlformats.org/officeDocument/2006/relationships" xmlns:mc="http://schemas.openxmlformats.org/markup-compatibility/2006" xmlns:mv="urn:schemas-microsoft-com:mac:vml" xmlns:p="http://schemas.openxmlformats.org/presentationml/2006/main" xmlns:c="http://schemas.openxmlformats.org/drawingml/2006/chart" xmlns:dgm="http://schemas.openxmlformats.org/drawingml/2006/diagram" xmlns:o="urn:schemas-microsoft-com:office:office" xmlns:v="urn:schemas-microsoft-com:vml" xmlns:pvml="urn:schemas-microsoft-com:office:powerpoint" xmlns:com="http://schemas.openxmlformats.org/drawingml/2006/compatibility" xmlns:p14="http://schemas.microsoft.com/office/powerpoint/2010/main" xmlns:p15="http://schemas.microsoft.com/office/powerpoint/2012/main">
+  <p:cSld>
+    <p:spTree>
+      <p:nvGrpSpPr>
+        <p:cNvPr id="132" name="Shape 132"/>
+        <p:cNvGrpSpPr/>
+        <p:nvPr/>
+      </p:nvGrpSpPr>
+      <p:grpSpPr>
+        <a:xfrm>
+          <a:off x="0" y="0"/>
+          <a:ext cx="0" cy="0"/>
+          <a:chOff x="0" y="0"/>
+          <a:chExt cx="0" cy="0"/>
+        </a:xfrm>
+      </p:grpSpPr>
+      <p:sp>
+        <p:nvSpPr>
+          <p:cNvPr id="133" name="Google Shape;133;p27"/>
+          <p:cNvSpPr txBox="1"/>
+          <p:nvPr>
+            <p:ph idx="1" type="body"/>
+          </p:nvPr>
+        </p:nvSpPr>
+        <p:spPr>
+          <a:xfrm>
+            <a:off x="311700" y="619075"/>
+            <a:ext cx="8520600" cy="3416400"/>
+          </a:xfrm>
+          <a:prstGeom prst="rect">
+            <a:avLst/>
+          </a:prstGeom>
+        </p:spPr>
+        <p:txBody>
+          <a:bodyPr anchorCtr="0" anchor="ctr" bIns="91425" lIns="91425" spcFirstLastPara="1" rIns="91425" wrap="square" tIns="91425">
+            <a:noAutofit/>
+          </a:bodyPr>
+          <a:lstStyle/>
+          <a:p>
+            <a:pPr indent="-381000" lvl="0" marL="457200" rtl="0" algn="ctr">
+              <a:spcBef>
+                <a:spcPts val="0"/>
+              </a:spcBef>
+              <a:spcAft>
+                <a:spcPts val="0"/>
+              </a:spcAft>
+              <a:buSzPts val="2400"/>
+              <a:buAutoNum type="arabicPeriod" startAt="6"/>
+            </a:pPr>
+            <a:r>
+              <a:rPr b="1" lang="fr" sz="2400"/>
+              <a:t>Patient detail entry</a:t>
+            </a:r>
+            <a:endParaRPr b="1" sz="2400"/>
+          </a:p>
+        </p:txBody>
+      </p:sp>
+    </p:spTree>
+  </p:cSld>
+  <p:clrMapOvr>
+    <a:masterClrMapping/>
+  </p:clrMapOvr>
+</p:sld>
+</file>
+
+<file path=ppt/slides/slide16.xml><?xml version="1.0" encoding="utf-8"?>
+<p:sld xmlns:a="http://schemas.openxmlformats.org/drawingml/2006/main" xmlns:r="http://schemas.openxmlformats.org/officeDocument/2006/relationships" xmlns:mc="http://schemas.openxmlformats.org/markup-compatibility/2006" xmlns:mv="urn:schemas-microsoft-com:mac:vml" xmlns:p="http://schemas.openxmlformats.org/presentationml/2006/main" xmlns:c="http://schemas.openxmlformats.org/drawingml/2006/chart" xmlns:dgm="http://schemas.openxmlformats.org/drawingml/2006/diagram" xmlns:o="urn:schemas-microsoft-com:office:office" xmlns:v="urn:schemas-microsoft-com:vml" xmlns:pvml="urn:schemas-microsoft-com:office:powerpoint" xmlns:com="http://schemas.openxmlformats.org/drawingml/2006/compatibility" xmlns:p14="http://schemas.microsoft.com/office/powerpoint/2010/main" xmlns:p15="http://schemas.microsoft.com/office/powerpoint/2012/main">
+  <p:cSld>
+    <p:spTree>
+      <p:nvGrpSpPr>
+        <p:cNvPr id="137" name="Shape 137"/>
+        <p:cNvGrpSpPr/>
+        <p:nvPr/>
+      </p:nvGrpSpPr>
+      <p:grpSpPr>
+        <a:xfrm>
+          <a:off x="0" y="0"/>
+          <a:ext cx="0" cy="0"/>
+          <a:chOff x="0" y="0"/>
+          <a:chExt cx="0" cy="0"/>
+        </a:xfrm>
+      </p:grpSpPr>
+      <p:sp>
+        <p:nvSpPr>
+          <p:cNvPr id="138" name="Google Shape;138;p28"/>
           <p:cNvSpPr txBox="1"/>
           <p:nvPr>
             <p:ph idx="1" type="body"/>
@@ -6749,39 +8683,215 @@
           <p:cNvPr id="65" name="Google Shape;65;p15"/>
           <p:cNvSpPr txBox="1"/>
           <p:nvPr>
-            <p:ph idx="1" type="body"/>
+            <p:ph type="title"/>
           </p:nvPr>
         </p:nvSpPr>
         <p:spPr>
           <a:xfrm>
-            <a:off x="311700" y="619075"/>
-            <a:ext cx="8520600" cy="3416400"/>
+            <a:off x="311700" y="-88375"/>
+            <a:ext cx="8520600" cy="572700"/>
           </a:xfrm>
           <a:prstGeom prst="rect">
             <a:avLst/>
           </a:prstGeom>
         </p:spPr>
         <p:txBody>
-          <a:bodyPr anchorCtr="0" anchor="ctr" bIns="91425" lIns="91425" spcFirstLastPara="1" rIns="91425" wrap="square" tIns="91425">
+          <a:bodyPr anchorCtr="0" anchor="t" bIns="91425" lIns="91425" spcFirstLastPara="1" rIns="91425" wrap="square" tIns="91425">
             <a:noAutofit/>
           </a:bodyPr>
           <a:lstStyle/>
           <a:p>
-            <a:pPr indent="-381000" lvl="0" marL="457200" rtl="0" algn="ctr">
-              <a:spcBef>
-                <a:spcPts val="0"/>
-              </a:spcBef>
-              <a:spcAft>
-                <a:spcPts val="0"/>
-              </a:spcAft>
-              <a:buSzPts val="2400"/>
-              <a:buAutoNum type="arabicPeriod" startAt="2"/>
-            </a:pPr>
-            <a:r>
-              <a:rPr b="1" lang="fr" sz="2400"/>
-              <a:t>Superuser patient / care provider CRUD operation</a:t>
-            </a:r>
-            <a:endParaRPr b="1" sz="2400"/>
+            <a:pPr indent="0" lvl="0" marL="0" rtl="0" algn="l">
+              <a:spcBef>
+                <a:spcPts val="0"/>
+              </a:spcBef>
+              <a:spcAft>
+                <a:spcPts val="0"/>
+              </a:spcAft>
+              <a:buNone/>
+            </a:pPr>
+            <a:r>
+              <a:rPr lang="fr"/>
+              <a:t>Abstract Code - Superuser login</a:t>
+            </a:r>
+            <a:endParaRPr/>
+          </a:p>
+        </p:txBody>
+      </p:sp>
+      <p:sp>
+        <p:nvSpPr>
+          <p:cNvPr id="66" name="Google Shape;66;p15"/>
+          <p:cNvSpPr txBox="1"/>
+          <p:nvPr>
+            <p:ph idx="1" type="body"/>
+          </p:nvPr>
+        </p:nvSpPr>
+        <p:spPr>
+          <a:xfrm>
+            <a:off x="311700" y="390475"/>
+            <a:ext cx="8520600" cy="4570200"/>
+          </a:xfrm>
+          <a:prstGeom prst="rect">
+            <a:avLst/>
+          </a:prstGeom>
+        </p:spPr>
+        <p:txBody>
+          <a:bodyPr anchorCtr="0" anchor="t" bIns="91425" lIns="91425" spcFirstLastPara="1" rIns="91425" wrap="square" tIns="91425">
+            <a:noAutofit/>
+          </a:bodyPr>
+          <a:lstStyle/>
+          <a:p>
+            <a:pPr indent="0" lvl="0" marL="0" rtl="0" algn="l">
+              <a:spcBef>
+                <a:spcPts val="0"/>
+              </a:spcBef>
+              <a:spcAft>
+                <a:spcPts val="0"/>
+              </a:spcAft>
+              <a:buNone/>
+            </a:pPr>
+            <a:r>
+              <a:rPr b="1" lang="fr" u="sng"/>
+              <a:t>Task decomposition flow</a:t>
+            </a:r>
+            <a:endParaRPr b="1" u="sng"/>
+          </a:p>
+          <a:p>
+            <a:pPr indent="-342900" lvl="0" marL="457200" rtl="0" algn="l">
+              <a:spcBef>
+                <a:spcPts val="1600"/>
+              </a:spcBef>
+              <a:spcAft>
+                <a:spcPts val="0"/>
+              </a:spcAft>
+              <a:buSzPts val="1800"/>
+              <a:buChar char="●"/>
+            </a:pPr>
+            <a:r>
+              <a:rPr lang="fr"/>
+              <a:t>Lookup the database to verify whether username exists (based on </a:t>
+            </a:r>
+            <a:r>
+              <a:rPr b="1" lang="fr"/>
+              <a:t>username</a:t>
+            </a:r>
+            <a:r>
+              <a:rPr lang="fr"/>
+              <a:t>)</a:t>
+            </a:r>
+            <a:endParaRPr/>
+          </a:p>
+          <a:p>
+            <a:pPr indent="-342900" lvl="0" marL="457200" rtl="0" algn="l">
+              <a:spcBef>
+                <a:spcPts val="0"/>
+              </a:spcBef>
+              <a:spcAft>
+                <a:spcPts val="0"/>
+              </a:spcAft>
+              <a:buSzPts val="1800"/>
+              <a:buChar char="●"/>
+            </a:pPr>
+            <a:r>
+              <a:rPr lang="fr"/>
+              <a:t>Requires </a:t>
+            </a:r>
+            <a:r>
+              <a:rPr b="1" lang="fr"/>
+              <a:t>username </a:t>
+            </a:r>
+            <a:r>
+              <a:rPr lang="fr"/>
+              <a:t>/ </a:t>
+            </a:r>
+            <a:r>
+              <a:rPr b="1" lang="fr"/>
+              <a:t>password</a:t>
+            </a:r>
+            <a:endParaRPr b="1"/>
+          </a:p>
+          <a:p>
+            <a:pPr indent="-342900" lvl="0" marL="457200" rtl="0" algn="l">
+              <a:spcBef>
+                <a:spcPts val="0"/>
+              </a:spcBef>
+              <a:spcAft>
+                <a:spcPts val="0"/>
+              </a:spcAft>
+              <a:buSzPts val="1800"/>
+              <a:buChar char="●"/>
+            </a:pPr>
+            <a:r>
+              <a:rPr lang="fr"/>
+              <a:t>Confirm that user has been found in the database</a:t>
+            </a:r>
+            <a:endParaRPr/>
+          </a:p>
+          <a:p>
+            <a:pPr indent="-342900" lvl="0" marL="457200" rtl="0" algn="l">
+              <a:spcBef>
+                <a:spcPts val="0"/>
+              </a:spcBef>
+              <a:spcAft>
+                <a:spcPts val="0"/>
+              </a:spcAft>
+              <a:buSzPts val="1800"/>
+              <a:buChar char="●"/>
+            </a:pPr>
+            <a:r>
+              <a:rPr lang="fr"/>
+              <a:t>Same frequency (1 search at a time)</a:t>
+            </a:r>
+            <a:endParaRPr/>
+          </a:p>
+          <a:p>
+            <a:pPr indent="-342900" lvl="0" marL="457200" rtl="0" algn="l">
+              <a:spcBef>
+                <a:spcPts val="0"/>
+              </a:spcBef>
+              <a:spcAft>
+                <a:spcPts val="0"/>
+              </a:spcAft>
+              <a:buSzPts val="1800"/>
+              <a:buChar char="●"/>
+            </a:pPr>
+            <a:r>
+              <a:rPr lang="fr"/>
+              <a:t>Consistency is key</a:t>
+            </a:r>
+            <a:endParaRPr/>
+          </a:p>
+          <a:p>
+            <a:pPr indent="-342900" lvl="0" marL="457200" rtl="0" algn="l">
+              <a:spcBef>
+                <a:spcPts val="0"/>
+              </a:spcBef>
+              <a:spcAft>
+                <a:spcPts val="0"/>
+              </a:spcAft>
+              <a:buSzPts val="1800"/>
+              <a:buChar char="●"/>
+            </a:pPr>
+            <a:r>
+              <a:rPr lang="fr"/>
+              <a:t>No Mother Task Needed</a:t>
+            </a:r>
+            <a:endParaRPr/>
+          </a:p>
+          <a:p>
+            <a:pPr indent="0" lvl="0" marL="914400" rtl="0" algn="l">
+              <a:spcBef>
+                <a:spcPts val="1600"/>
+              </a:spcBef>
+              <a:spcAft>
+                <a:spcPts val="1600"/>
+              </a:spcAft>
+              <a:buNone/>
+            </a:pPr>
+            <a:r>
+              <a:t/>
+            </a:r>
+            <a:endParaRPr/>
           </a:p>
         </p:txBody>
       </p:sp>
@@ -6798,7 +8908,7 @@
   <p:cSld>
     <p:spTree>
       <p:nvGrpSpPr>
-        <p:cNvPr id="69" name="Shape 69"/>
+        <p:cNvPr id="70" name="Shape 70"/>
         <p:cNvGrpSpPr/>
         <p:nvPr/>
       </p:nvGrpSpPr>
@@ -6812,7 +8922,398 @@
       </p:grpSpPr>
       <p:sp>
         <p:nvSpPr>
-          <p:cNvPr id="70" name="Google Shape;70;p16"/>
+          <p:cNvPr id="71" name="Google Shape;71;p16"/>
+          <p:cNvSpPr txBox="1"/>
+          <p:nvPr>
+            <p:ph type="title"/>
+          </p:nvPr>
+        </p:nvSpPr>
+        <p:spPr>
+          <a:xfrm>
+            <a:off x="311700" y="-88375"/>
+            <a:ext cx="8520600" cy="572700"/>
+          </a:xfrm>
+          <a:prstGeom prst="rect">
+            <a:avLst/>
+          </a:prstGeom>
+        </p:spPr>
+        <p:txBody>
+          <a:bodyPr anchorCtr="0" anchor="t" bIns="91425" lIns="91425" spcFirstLastPara="1" rIns="91425" wrap="square" tIns="91425">
+            <a:noAutofit/>
+          </a:bodyPr>
+          <a:lstStyle/>
+          <a:p>
+            <a:pPr indent="0" lvl="0" marL="0" rtl="0" algn="l">
+              <a:spcBef>
+                <a:spcPts val="0"/>
+              </a:spcBef>
+              <a:spcAft>
+                <a:spcPts val="0"/>
+              </a:spcAft>
+              <a:buClr>
+                <a:schemeClr val="dk1"/>
+              </a:buClr>
+              <a:buSzPts val="1100"/>
+              <a:buFont typeface="Arial"/>
+              <a:buNone/>
+            </a:pPr>
+            <a:r>
+              <a:rPr lang="fr"/>
+              <a:t>Abstract Code - </a:t>
+            </a:r>
+            <a:r>
+              <a:rPr lang="fr"/>
+              <a:t>Superuser login</a:t>
+            </a:r>
+            <a:endParaRPr/>
+          </a:p>
+          <a:p>
+            <a:pPr indent="0" lvl="0" marL="0" rtl="0" algn="l">
+              <a:spcBef>
+                <a:spcPts val="0"/>
+              </a:spcBef>
+              <a:spcAft>
+                <a:spcPts val="0"/>
+              </a:spcAft>
+              <a:buNone/>
+            </a:pPr>
+            <a:r>
+              <a:t/>
+            </a:r>
+            <a:endParaRPr/>
+          </a:p>
+        </p:txBody>
+      </p:sp>
+      <p:sp>
+        <p:nvSpPr>
+          <p:cNvPr id="72" name="Google Shape;72;p16"/>
+          <p:cNvSpPr txBox="1"/>
+          <p:nvPr>
+            <p:ph idx="1" type="body"/>
+          </p:nvPr>
+        </p:nvSpPr>
+        <p:spPr>
+          <a:xfrm>
+            <a:off x="311700" y="390475"/>
+            <a:ext cx="8520600" cy="4570200"/>
+          </a:xfrm>
+          <a:prstGeom prst="rect">
+            <a:avLst/>
+          </a:prstGeom>
+        </p:spPr>
+        <p:txBody>
+          <a:bodyPr anchorCtr="0" anchor="t" bIns="91425" lIns="91425" spcFirstLastPara="1" rIns="91425" wrap="square" tIns="91425">
+            <a:noAutofit/>
+          </a:bodyPr>
+          <a:lstStyle/>
+          <a:p>
+            <a:pPr indent="0" lvl="0" marL="0" rtl="0" algn="l">
+              <a:spcBef>
+                <a:spcPts val="0"/>
+              </a:spcBef>
+              <a:spcAft>
+                <a:spcPts val="0"/>
+              </a:spcAft>
+              <a:buNone/>
+            </a:pPr>
+            <a:r>
+              <a:rPr b="1" lang="fr" u="sng"/>
+              <a:t>Abstract Code</a:t>
+            </a:r>
+            <a:endParaRPr b="1" u="sng"/>
+          </a:p>
+          <a:p>
+            <a:pPr indent="-342900" lvl="0" marL="457200" rtl="0" algn="l">
+              <a:spcBef>
+                <a:spcPts val="1600"/>
+              </a:spcBef>
+              <a:spcAft>
+                <a:spcPts val="0"/>
+              </a:spcAft>
+              <a:buSzPts val="1800"/>
+              <a:buChar char="●"/>
+            </a:pPr>
+            <a:r>
+              <a:rPr lang="fr"/>
+              <a:t>User enters </a:t>
+            </a:r>
+            <a:r>
+              <a:rPr b="1" lang="fr"/>
+              <a:t>username </a:t>
+            </a:r>
+            <a:r>
+              <a:rPr lang="fr"/>
+              <a:t>/ </a:t>
+            </a:r>
+            <a:r>
+              <a:rPr b="1" lang="fr"/>
+              <a:t>password </a:t>
+            </a:r>
+            <a:r>
+              <a:rPr lang="fr"/>
+              <a:t>input fields. </a:t>
+            </a:r>
+            <a:endParaRPr/>
+          </a:p>
+          <a:p>
+            <a:pPr indent="-342900" lvl="0" marL="457200" rtl="0" algn="l">
+              <a:spcBef>
+                <a:spcPts val="0"/>
+              </a:spcBef>
+              <a:spcAft>
+                <a:spcPts val="0"/>
+              </a:spcAft>
+              <a:buSzPts val="1800"/>
+              <a:buChar char="●"/>
+            </a:pPr>
+            <a:r>
+              <a:rPr lang="fr"/>
+              <a:t>IF input field NOT empty AND do not contain any invalid characters THEN:</a:t>
+            </a:r>
+            <a:endParaRPr/>
+          </a:p>
+          <a:p>
+            <a:pPr indent="-342900" lvl="1" marL="914400" rtl="0" algn="l">
+              <a:spcBef>
+                <a:spcPts val="0"/>
+              </a:spcBef>
+              <a:spcAft>
+                <a:spcPts val="0"/>
+              </a:spcAft>
+              <a:buSzPts val="1800"/>
+              <a:buChar char="○"/>
+            </a:pPr>
+            <a:r>
+              <a:rPr lang="fr" sz="1800"/>
+              <a:t>When </a:t>
+            </a:r>
+            <a:r>
+              <a:rPr b="1" lang="fr" sz="1800"/>
+              <a:t>LOGIN </a:t>
+            </a:r>
+            <a:r>
+              <a:rPr lang="fr" sz="1800"/>
+              <a:t>button is clicked:</a:t>
+            </a:r>
+            <a:endParaRPr sz="1800"/>
+          </a:p>
+          <a:p>
+            <a:pPr indent="-342900" lvl="2" marL="1371600" rtl="0" algn="l">
+              <a:spcBef>
+                <a:spcPts val="0"/>
+              </a:spcBef>
+              <a:spcAft>
+                <a:spcPts val="0"/>
+              </a:spcAft>
+              <a:buSzPts val="1800"/>
+              <a:buChar char="■"/>
+            </a:pPr>
+            <a:r>
+              <a:rPr lang="fr" sz="1800"/>
+              <a:t>IF </a:t>
+            </a:r>
+            <a:r>
+              <a:rPr b="1" lang="fr" sz="1800"/>
+              <a:t>username </a:t>
+            </a:r>
+            <a:r>
+              <a:rPr lang="fr" sz="1800"/>
+              <a:t>/ hashed </a:t>
+            </a:r>
+            <a:r>
+              <a:rPr b="1" lang="fr" sz="1800"/>
+              <a:t>password </a:t>
+            </a:r>
+            <a:r>
+              <a:rPr lang="fr" sz="1800"/>
+              <a:t>found in database then:</a:t>
+            </a:r>
+            <a:endParaRPr sz="1800"/>
+          </a:p>
+          <a:p>
+            <a:pPr indent="-342900" lvl="3" marL="1828800" rtl="0" algn="l">
+              <a:spcBef>
+                <a:spcPts val="0"/>
+              </a:spcBef>
+              <a:spcAft>
+                <a:spcPts val="0"/>
+              </a:spcAft>
+              <a:buSzPts val="1800"/>
+              <a:buChar char="●"/>
+            </a:pPr>
+            <a:r>
+              <a:rPr lang="fr" sz="1800"/>
+              <a:t>Redirect to </a:t>
+            </a:r>
+            <a:r>
+              <a:rPr b="1" lang="fr" sz="1800"/>
+              <a:t>home </a:t>
+            </a:r>
+            <a:r>
+              <a:rPr lang="fr" sz="1800"/>
+              <a:t>page</a:t>
+            </a:r>
+            <a:endParaRPr sz="1800"/>
+          </a:p>
+          <a:p>
+            <a:pPr indent="-342900" lvl="2" marL="1371600" rtl="0" algn="l">
+              <a:spcBef>
+                <a:spcPts val="0"/>
+              </a:spcBef>
+              <a:spcAft>
+                <a:spcPts val="0"/>
+              </a:spcAft>
+              <a:buSzPts val="1800"/>
+              <a:buChar char="■"/>
+            </a:pPr>
+            <a:r>
+              <a:rPr lang="fr" sz="1800"/>
+              <a:t>ELSE </a:t>
+            </a:r>
+            <a:endParaRPr sz="1800"/>
+          </a:p>
+          <a:p>
+            <a:pPr indent="-342900" lvl="3" marL="1828800" rtl="0" algn="l">
+              <a:spcBef>
+                <a:spcPts val="0"/>
+              </a:spcBef>
+              <a:spcAft>
+                <a:spcPts val="0"/>
+              </a:spcAft>
+              <a:buSzPts val="1800"/>
+              <a:buChar char="●"/>
+            </a:pPr>
+            <a:r>
+              <a:rPr lang="fr" sz="1800"/>
+              <a:t>Go back to login form with error message</a:t>
+            </a:r>
+            <a:endParaRPr sz="1800"/>
+          </a:p>
+          <a:p>
+            <a:pPr indent="-342900" lvl="1" marL="914400" rtl="0" algn="l">
+              <a:spcBef>
+                <a:spcPts val="0"/>
+              </a:spcBef>
+              <a:spcAft>
+                <a:spcPts val="0"/>
+              </a:spcAft>
+              <a:buSzPts val="1800"/>
+              <a:buChar char="○"/>
+            </a:pPr>
+            <a:r>
+              <a:rPr lang="fr" sz="1800"/>
+              <a:t>Go to </a:t>
+            </a:r>
+            <a:r>
+              <a:rPr b="1" lang="fr" sz="1800"/>
+              <a:t>home </a:t>
+            </a:r>
+            <a:r>
+              <a:rPr lang="fr" sz="1800"/>
+              <a:t>page</a:t>
+            </a:r>
+            <a:endParaRPr sz="1800"/>
+          </a:p>
+          <a:p>
+            <a:pPr indent="-342900" lvl="0" marL="457200" rtl="0" algn="l">
+              <a:spcBef>
+                <a:spcPts val="0"/>
+              </a:spcBef>
+              <a:spcAft>
+                <a:spcPts val="0"/>
+              </a:spcAft>
+              <a:buSzPts val="1800"/>
+              <a:buChar char="●"/>
+            </a:pPr>
+            <a:r>
+              <a:rPr lang="fr"/>
+              <a:t>ELSE field values are invalid, display </a:t>
+            </a:r>
+            <a:r>
+              <a:rPr b="1" lang="fr"/>
+              <a:t>login </a:t>
+            </a:r>
+            <a:r>
+              <a:rPr lang="fr"/>
+              <a:t>form with error message</a:t>
+            </a:r>
+            <a:endParaRPr sz="1800"/>
+          </a:p>
+          <a:p>
+            <a:pPr indent="0" lvl="0" marL="1371600" rtl="0" algn="l">
+              <a:spcBef>
+                <a:spcPts val="1600"/>
+              </a:spcBef>
+              <a:spcAft>
+                <a:spcPts val="0"/>
+              </a:spcAft>
+              <a:buNone/>
+            </a:pPr>
+            <a:r>
+              <a:t/>
+            </a:r>
+            <a:endParaRPr sz="1800"/>
+          </a:p>
+          <a:p>
+            <a:pPr indent="0" lvl="0" marL="457200" rtl="0" algn="l">
+              <a:spcBef>
+                <a:spcPts val="1600"/>
+              </a:spcBef>
+              <a:spcAft>
+                <a:spcPts val="0"/>
+              </a:spcAft>
+              <a:buNone/>
+            </a:pPr>
+            <a:r>
+              <a:t/>
+            </a:r>
+            <a:endParaRPr b="1" u="sng"/>
+          </a:p>
+          <a:p>
+            <a:pPr indent="0" lvl="0" marL="914400" rtl="0" algn="l">
+              <a:spcBef>
+                <a:spcPts val="1600"/>
+              </a:spcBef>
+              <a:spcAft>
+                <a:spcPts val="1600"/>
+              </a:spcAft>
+              <a:buNone/>
+            </a:pPr>
+            <a:r>
+              <a:t/>
+            </a:r>
+            <a:endParaRPr/>
+          </a:p>
+        </p:txBody>
+      </p:sp>
+    </p:spTree>
+  </p:cSld>
+  <p:clrMapOvr>
+    <a:masterClrMapping/>
+  </p:clrMapOvr>
+</p:sld>
+</file>
+
+<file path=ppt/slides/slide5.xml><?xml version="1.0" encoding="utf-8"?>
+<p:sld xmlns:a="http://schemas.openxmlformats.org/drawingml/2006/main" xmlns:r="http://schemas.openxmlformats.org/officeDocument/2006/relationships" xmlns:mc="http://schemas.openxmlformats.org/markup-compatibility/2006" xmlns:mv="urn:schemas-microsoft-com:mac:vml" xmlns:p="http://schemas.openxmlformats.org/presentationml/2006/main" xmlns:c="http://schemas.openxmlformats.org/drawingml/2006/chart" xmlns:dgm="http://schemas.openxmlformats.org/drawingml/2006/diagram" xmlns:o="urn:schemas-microsoft-com:office:office" xmlns:v="urn:schemas-microsoft-com:vml" xmlns:pvml="urn:schemas-microsoft-com:office:powerpoint" xmlns:com="http://schemas.openxmlformats.org/drawingml/2006/compatibility" xmlns:p14="http://schemas.microsoft.com/office/powerpoint/2010/main" xmlns:p15="http://schemas.microsoft.com/office/powerpoint/2012/main">
+  <p:cSld>
+    <p:spTree>
+      <p:nvGrpSpPr>
+        <p:cNvPr id="76" name="Shape 76"/>
+        <p:cNvGrpSpPr/>
+        <p:nvPr/>
+      </p:nvGrpSpPr>
+      <p:grpSpPr>
+        <a:xfrm>
+          <a:off x="0" y="0"/>
+          <a:ext cx="0" cy="0"/>
+          <a:chOff x="0" y="0"/>
+          <a:chExt cx="0" cy="0"/>
+        </a:xfrm>
+      </p:grpSpPr>
+      <p:sp>
+        <p:nvSpPr>
+          <p:cNvPr id="77" name="Google Shape;77;p17"/>
           <p:cNvSpPr txBox="1"/>
           <p:nvPr>
             <p:ph idx="1" type="body"/>
@@ -6841,11 +9342,11 @@
                 <a:spcPts val="0"/>
               </a:spcAft>
               <a:buSzPts val="2400"/>
-              <a:buAutoNum type="arabicPeriod" startAt="3"/>
+              <a:buAutoNum type="arabicPeriod" startAt="2"/>
             </a:pPr>
             <a:r>
               <a:rPr b="1" lang="fr" sz="2400"/>
-              <a:t>Care provider registration</a:t>
+              <a:t>Superuser patient / care provider CRUD operation</a:t>
             </a:r>
             <a:endParaRPr b="1" sz="2400"/>
           </a:p>
@@ -6859,12 +9360,12 @@
 </p:sld>
 </file>
 
-<file path=ppt/slides/slide5.xml><?xml version="1.0" encoding="utf-8"?>
+<file path=ppt/slides/slide6.xml><?xml version="1.0" encoding="utf-8"?>
 <p:sld xmlns:a="http://schemas.openxmlformats.org/drawingml/2006/main" xmlns:r="http://schemas.openxmlformats.org/officeDocument/2006/relationships" xmlns:mc="http://schemas.openxmlformats.org/markup-compatibility/2006" xmlns:mv="urn:schemas-microsoft-com:mac:vml" xmlns:p="http://schemas.openxmlformats.org/presentationml/2006/main" xmlns:c="http://schemas.openxmlformats.org/drawingml/2006/chart" xmlns:dgm="http://schemas.openxmlformats.org/drawingml/2006/diagram" xmlns:o="urn:schemas-microsoft-com:office:office" xmlns:v="urn:schemas-microsoft-com:vml" xmlns:pvml="urn:schemas-microsoft-com:office:powerpoint" xmlns:com="http://schemas.openxmlformats.org/drawingml/2006/compatibility" xmlns:p14="http://schemas.microsoft.com/office/powerpoint/2010/main" xmlns:p15="http://schemas.microsoft.com/office/powerpoint/2012/main">
   <p:cSld>
     <p:spTree>
       <p:nvGrpSpPr>
-        <p:cNvPr id="74" name="Shape 74"/>
+        <p:cNvPr id="81" name="Shape 81"/>
         <p:cNvGrpSpPr/>
         <p:nvPr/>
       </p:nvGrpSpPr>
@@ -6878,7 +9379,7 @@
       </p:grpSpPr>
       <p:sp>
         <p:nvSpPr>
-          <p:cNvPr id="75" name="Google Shape;75;p17"/>
+          <p:cNvPr id="82" name="Google Shape;82;p18"/>
           <p:cNvSpPr txBox="1"/>
           <p:nvPr>
             <p:ph idx="1" type="body"/>
@@ -6907,11 +9408,11 @@
                 <a:spcPts val="0"/>
               </a:spcAft>
               <a:buSzPts val="2400"/>
-              <a:buAutoNum type="arabicPeriod" startAt="4"/>
+              <a:buAutoNum type="arabicPeriod" startAt="3"/>
             </a:pPr>
             <a:r>
               <a:rPr b="1" lang="fr" sz="2400"/>
-              <a:t>Care provider login</a:t>
+              <a:t>Care provider registration</a:t>
             </a:r>
             <a:endParaRPr b="1" sz="2400"/>
           </a:p>
@@ -6925,12 +9426,12 @@
 </p:sld>
 </file>
 
-<file path=ppt/slides/slide6.xml><?xml version="1.0" encoding="utf-8"?>
+<file path=ppt/slides/slide7.xml><?xml version="1.0" encoding="utf-8"?>
 <p:sld xmlns:a="http://schemas.openxmlformats.org/drawingml/2006/main" xmlns:r="http://schemas.openxmlformats.org/officeDocument/2006/relationships" xmlns:mc="http://schemas.openxmlformats.org/markup-compatibility/2006" xmlns:mv="urn:schemas-microsoft-com:mac:vml" xmlns:p="http://schemas.openxmlformats.org/presentationml/2006/main" xmlns:c="http://schemas.openxmlformats.org/drawingml/2006/chart" xmlns:dgm="http://schemas.openxmlformats.org/drawingml/2006/diagram" xmlns:o="urn:schemas-microsoft-com:office:office" xmlns:v="urn:schemas-microsoft-com:vml" xmlns:pvml="urn:schemas-microsoft-com:office:powerpoint" xmlns:com="http://schemas.openxmlformats.org/drawingml/2006/compatibility" xmlns:p14="http://schemas.microsoft.com/office/powerpoint/2010/main" xmlns:p15="http://schemas.microsoft.com/office/powerpoint/2012/main">
   <p:cSld>
     <p:spTree>
       <p:nvGrpSpPr>
-        <p:cNvPr id="79" name="Shape 79"/>
+        <p:cNvPr id="86" name="Shape 86"/>
         <p:cNvGrpSpPr/>
         <p:nvPr/>
       </p:nvGrpSpPr>
@@ -6944,7 +9445,660 @@
       </p:grpSpPr>
       <p:sp>
         <p:nvSpPr>
-          <p:cNvPr id="80" name="Google Shape;80;p18"/>
+          <p:cNvPr id="87" name="Google Shape;87;p19"/>
+          <p:cNvSpPr txBox="1"/>
+          <p:nvPr>
+            <p:ph type="title"/>
+          </p:nvPr>
+        </p:nvSpPr>
+        <p:spPr>
+          <a:xfrm>
+            <a:off x="311700" y="-88375"/>
+            <a:ext cx="8520600" cy="572700"/>
+          </a:xfrm>
+          <a:prstGeom prst="rect">
+            <a:avLst/>
+          </a:prstGeom>
+        </p:spPr>
+        <p:txBody>
+          <a:bodyPr anchorCtr="0" anchor="t" bIns="91425" lIns="91425" spcFirstLastPara="1" rIns="91425" wrap="square" tIns="91425">
+            <a:noAutofit/>
+          </a:bodyPr>
+          <a:lstStyle/>
+          <a:p>
+            <a:pPr indent="0" lvl="0" marL="0" rtl="0" algn="l">
+              <a:spcBef>
+                <a:spcPts val="0"/>
+              </a:spcBef>
+              <a:spcAft>
+                <a:spcPts val="0"/>
+              </a:spcAft>
+              <a:buNone/>
+            </a:pPr>
+            <a:r>
+              <a:rPr lang="fr"/>
+              <a:t>Abstract Code - </a:t>
+            </a:r>
+            <a:r>
+              <a:rPr lang="fr"/>
+              <a:t>Care provider </a:t>
+            </a:r>
+            <a:r>
+              <a:rPr lang="fr"/>
+              <a:t>registration</a:t>
+            </a:r>
+            <a:endParaRPr/>
+          </a:p>
+        </p:txBody>
+      </p:sp>
+      <p:sp>
+        <p:nvSpPr>
+          <p:cNvPr id="88" name="Google Shape;88;p19"/>
+          <p:cNvSpPr txBox="1"/>
+          <p:nvPr>
+            <p:ph idx="1" type="body"/>
+          </p:nvPr>
+        </p:nvSpPr>
+        <p:spPr>
+          <a:xfrm>
+            <a:off x="311700" y="390475"/>
+            <a:ext cx="8520600" cy="4570200"/>
+          </a:xfrm>
+          <a:prstGeom prst="rect">
+            <a:avLst/>
+          </a:prstGeom>
+        </p:spPr>
+        <p:txBody>
+          <a:bodyPr anchorCtr="0" anchor="t" bIns="91425" lIns="91425" spcFirstLastPara="1" rIns="91425" wrap="square" tIns="91425">
+            <a:noAutofit/>
+          </a:bodyPr>
+          <a:lstStyle/>
+          <a:p>
+            <a:pPr indent="0" lvl="0" marL="0" rtl="0" algn="l">
+              <a:spcBef>
+                <a:spcPts val="0"/>
+              </a:spcBef>
+              <a:spcAft>
+                <a:spcPts val="0"/>
+              </a:spcAft>
+              <a:buNone/>
+            </a:pPr>
+            <a:r>
+              <a:rPr b="1" lang="fr" u="sng"/>
+              <a:t>Task decomposition flow</a:t>
+            </a:r>
+            <a:endParaRPr b="1" u="sng"/>
+          </a:p>
+          <a:p>
+            <a:pPr indent="-342900" lvl="0" marL="457200" rtl="0" algn="l">
+              <a:spcBef>
+                <a:spcPts val="1600"/>
+              </a:spcBef>
+              <a:spcAft>
+                <a:spcPts val="0"/>
+              </a:spcAft>
+              <a:buSzPts val="1800"/>
+              <a:buChar char="●"/>
+            </a:pPr>
+            <a:r>
+              <a:rPr lang="fr"/>
+              <a:t>Lookup the database to verify whether </a:t>
+            </a:r>
+            <a:r>
+              <a:rPr b="1" lang="fr"/>
+              <a:t>username </a:t>
+            </a:r>
+            <a:r>
+              <a:rPr lang="fr"/>
+              <a:t>(care provider) </a:t>
+            </a:r>
+            <a:r>
+              <a:rPr lang="fr"/>
+              <a:t>exists (based on </a:t>
+            </a:r>
+            <a:r>
+              <a:rPr b="1" lang="fr"/>
+              <a:t>username</a:t>
+            </a:r>
+            <a:r>
+              <a:rPr lang="fr"/>
+              <a:t>)</a:t>
+            </a:r>
+            <a:endParaRPr/>
+          </a:p>
+          <a:p>
+            <a:pPr indent="-342900" lvl="0" marL="457200" rtl="0" algn="l">
+              <a:spcBef>
+                <a:spcPts val="0"/>
+              </a:spcBef>
+              <a:spcAft>
+                <a:spcPts val="0"/>
+              </a:spcAft>
+              <a:buSzPts val="1800"/>
+              <a:buChar char="●"/>
+            </a:pPr>
+            <a:r>
+              <a:rPr lang="fr"/>
+              <a:t>Requires </a:t>
+            </a:r>
+            <a:r>
+              <a:rPr b="1" lang="fr"/>
+              <a:t>username </a:t>
+            </a:r>
+            <a:r>
+              <a:rPr lang="fr"/>
+              <a:t>/ </a:t>
+            </a:r>
+            <a:r>
+              <a:rPr b="1" lang="fr"/>
+              <a:t>password</a:t>
+            </a:r>
+            <a:endParaRPr b="1"/>
+          </a:p>
+          <a:p>
+            <a:pPr indent="-342900" lvl="0" marL="457200" rtl="0" algn="l">
+              <a:spcBef>
+                <a:spcPts val="0"/>
+              </a:spcBef>
+              <a:spcAft>
+                <a:spcPts val="0"/>
+              </a:spcAft>
+              <a:buSzPts val="1800"/>
+              <a:buChar char="●"/>
+            </a:pPr>
+            <a:r>
+              <a:rPr lang="fr"/>
+              <a:t>Confirm that user has been registered in the database</a:t>
+            </a:r>
+            <a:endParaRPr/>
+          </a:p>
+          <a:p>
+            <a:pPr indent="-342900" lvl="0" marL="457200" rtl="0" algn="l">
+              <a:spcBef>
+                <a:spcPts val="0"/>
+              </a:spcBef>
+              <a:spcAft>
+                <a:spcPts val="0"/>
+              </a:spcAft>
+              <a:buSzPts val="1800"/>
+              <a:buChar char="●"/>
+            </a:pPr>
+            <a:r>
+              <a:rPr lang="fr"/>
+              <a:t>Same frequency (1 search at a time)</a:t>
+            </a:r>
+            <a:endParaRPr/>
+          </a:p>
+          <a:p>
+            <a:pPr indent="-342900" lvl="0" marL="457200" rtl="0" algn="l">
+              <a:spcBef>
+                <a:spcPts val="0"/>
+              </a:spcBef>
+              <a:spcAft>
+                <a:spcPts val="0"/>
+              </a:spcAft>
+              <a:buSzPts val="1800"/>
+              <a:buChar char="●"/>
+            </a:pPr>
+            <a:r>
+              <a:rPr lang="fr"/>
+              <a:t>Consistency is key</a:t>
+            </a:r>
+            <a:endParaRPr/>
+          </a:p>
+          <a:p>
+            <a:pPr indent="-342900" lvl="0" marL="457200" rtl="0" algn="l">
+              <a:spcBef>
+                <a:spcPts val="0"/>
+              </a:spcBef>
+              <a:spcAft>
+                <a:spcPts val="0"/>
+              </a:spcAft>
+              <a:buSzPts val="1800"/>
+              <a:buChar char="●"/>
+            </a:pPr>
+            <a:r>
+              <a:rPr lang="fr"/>
+              <a:t>No Mother Task Needed</a:t>
+            </a:r>
+            <a:endParaRPr/>
+          </a:p>
+          <a:p>
+            <a:pPr indent="0" lvl="0" marL="914400" rtl="0" algn="l">
+              <a:spcBef>
+                <a:spcPts val="1600"/>
+              </a:spcBef>
+              <a:spcAft>
+                <a:spcPts val="1600"/>
+              </a:spcAft>
+              <a:buNone/>
+            </a:pPr>
+            <a:r>
+              <a:t/>
+            </a:r>
+            <a:endParaRPr/>
+          </a:p>
+        </p:txBody>
+      </p:sp>
+    </p:spTree>
+  </p:cSld>
+  <p:clrMapOvr>
+    <a:masterClrMapping/>
+  </p:clrMapOvr>
+</p:sld>
+</file>
+
+<file path=ppt/slides/slide8.xml><?xml version="1.0" encoding="utf-8"?>
+<p:sld xmlns:a="http://schemas.openxmlformats.org/drawingml/2006/main" xmlns:r="http://schemas.openxmlformats.org/officeDocument/2006/relationships" xmlns:mc="http://schemas.openxmlformats.org/markup-compatibility/2006" xmlns:mv="urn:schemas-microsoft-com:mac:vml" xmlns:p="http://schemas.openxmlformats.org/presentationml/2006/main" xmlns:c="http://schemas.openxmlformats.org/drawingml/2006/chart" xmlns:dgm="http://schemas.openxmlformats.org/drawingml/2006/diagram" xmlns:o="urn:schemas-microsoft-com:office:office" xmlns:v="urn:schemas-microsoft-com:vml" xmlns:pvml="urn:schemas-microsoft-com:office:powerpoint" xmlns:com="http://schemas.openxmlformats.org/drawingml/2006/compatibility" xmlns:p14="http://schemas.microsoft.com/office/powerpoint/2010/main" xmlns:p15="http://schemas.microsoft.com/office/powerpoint/2012/main">
+  <p:cSld>
+    <p:spTree>
+      <p:nvGrpSpPr>
+        <p:cNvPr id="92" name="Shape 92"/>
+        <p:cNvGrpSpPr/>
+        <p:nvPr/>
+      </p:nvGrpSpPr>
+      <p:grpSpPr>
+        <a:xfrm>
+          <a:off x="0" y="0"/>
+          <a:ext cx="0" cy="0"/>
+          <a:chOff x="0" y="0"/>
+          <a:chExt cx="0" cy="0"/>
+        </a:xfrm>
+      </p:grpSpPr>
+      <p:sp>
+        <p:nvSpPr>
+          <p:cNvPr id="93" name="Google Shape;93;p20"/>
+          <p:cNvSpPr txBox="1"/>
+          <p:nvPr>
+            <p:ph type="title"/>
+          </p:nvPr>
+        </p:nvSpPr>
+        <p:spPr>
+          <a:xfrm>
+            <a:off x="311700" y="-88375"/>
+            <a:ext cx="8520600" cy="572700"/>
+          </a:xfrm>
+          <a:prstGeom prst="rect">
+            <a:avLst/>
+          </a:prstGeom>
+        </p:spPr>
+        <p:txBody>
+          <a:bodyPr anchorCtr="0" anchor="t" bIns="91425" lIns="91425" spcFirstLastPara="1" rIns="91425" wrap="square" tIns="91425">
+            <a:noAutofit/>
+          </a:bodyPr>
+          <a:lstStyle/>
+          <a:p>
+            <a:pPr indent="0" lvl="0" marL="0" rtl="0" algn="l">
+              <a:spcBef>
+                <a:spcPts val="0"/>
+              </a:spcBef>
+              <a:spcAft>
+                <a:spcPts val="0"/>
+              </a:spcAft>
+              <a:buClr>
+                <a:schemeClr val="dk1"/>
+              </a:buClr>
+              <a:buSzPts val="1100"/>
+              <a:buFont typeface="Arial"/>
+              <a:buNone/>
+            </a:pPr>
+            <a:r>
+              <a:rPr lang="fr"/>
+              <a:t>Abstract Code - Care provider registration</a:t>
+            </a:r>
+            <a:endParaRPr/>
+          </a:p>
+          <a:p>
+            <a:pPr indent="0" lvl="0" marL="0" rtl="0" algn="l">
+              <a:spcBef>
+                <a:spcPts val="0"/>
+              </a:spcBef>
+              <a:spcAft>
+                <a:spcPts val="0"/>
+              </a:spcAft>
+              <a:buNone/>
+            </a:pPr>
+            <a:r>
+              <a:t/>
+            </a:r>
+            <a:endParaRPr/>
+          </a:p>
+        </p:txBody>
+      </p:sp>
+      <p:sp>
+        <p:nvSpPr>
+          <p:cNvPr id="94" name="Google Shape;94;p20"/>
+          <p:cNvSpPr txBox="1"/>
+          <p:nvPr>
+            <p:ph idx="1" type="body"/>
+          </p:nvPr>
+        </p:nvSpPr>
+        <p:spPr>
+          <a:xfrm>
+            <a:off x="311700" y="390475"/>
+            <a:ext cx="8520600" cy="4570200"/>
+          </a:xfrm>
+          <a:prstGeom prst="rect">
+            <a:avLst/>
+          </a:prstGeom>
+        </p:spPr>
+        <p:txBody>
+          <a:bodyPr anchorCtr="0" anchor="t" bIns="91425" lIns="91425" spcFirstLastPara="1" rIns="91425" wrap="square" tIns="91425">
+            <a:noAutofit/>
+          </a:bodyPr>
+          <a:lstStyle/>
+          <a:p>
+            <a:pPr indent="0" lvl="0" marL="0" rtl="0" algn="l">
+              <a:spcBef>
+                <a:spcPts val="0"/>
+              </a:spcBef>
+              <a:spcAft>
+                <a:spcPts val="0"/>
+              </a:spcAft>
+              <a:buNone/>
+            </a:pPr>
+            <a:r>
+              <a:rPr b="1" lang="fr" u="sng"/>
+              <a:t>Abstract Code</a:t>
+            </a:r>
+            <a:endParaRPr b="1" u="sng"/>
+          </a:p>
+          <a:p>
+            <a:pPr indent="-342900" lvl="0" marL="457200" rtl="0" algn="l">
+              <a:spcBef>
+                <a:spcPts val="1600"/>
+              </a:spcBef>
+              <a:spcAft>
+                <a:spcPts val="0"/>
+              </a:spcAft>
+              <a:buSzPts val="1800"/>
+              <a:buChar char="●"/>
+            </a:pPr>
+            <a:r>
+              <a:rPr lang="fr"/>
+              <a:t>User enters </a:t>
+            </a:r>
+            <a:r>
+              <a:rPr b="1" lang="fr"/>
+              <a:t>username </a:t>
+            </a:r>
+            <a:r>
+              <a:rPr lang="fr"/>
+              <a:t>/ </a:t>
+            </a:r>
+            <a:r>
+              <a:rPr b="1" lang="fr"/>
+              <a:t>password </a:t>
+            </a:r>
+            <a:r>
+              <a:rPr lang="fr"/>
+              <a:t>input fields. </a:t>
+            </a:r>
+            <a:endParaRPr/>
+          </a:p>
+          <a:p>
+            <a:pPr indent="-342900" lvl="0" marL="457200" rtl="0" algn="l">
+              <a:spcBef>
+                <a:spcPts val="0"/>
+              </a:spcBef>
+              <a:spcAft>
+                <a:spcPts val="0"/>
+              </a:spcAft>
+              <a:buSzPts val="1800"/>
+              <a:buChar char="●"/>
+            </a:pPr>
+            <a:r>
+              <a:rPr lang="fr"/>
+              <a:t>IF input field NOT empty AND do not contain any invalid characters THEN:</a:t>
+            </a:r>
+            <a:endParaRPr/>
+          </a:p>
+          <a:p>
+            <a:pPr indent="-342900" lvl="1" marL="914400" rtl="0" algn="l">
+              <a:spcBef>
+                <a:spcPts val="0"/>
+              </a:spcBef>
+              <a:spcAft>
+                <a:spcPts val="0"/>
+              </a:spcAft>
+              <a:buSzPts val="1800"/>
+              <a:buChar char="○"/>
+            </a:pPr>
+            <a:r>
+              <a:rPr lang="fr" sz="1800"/>
+              <a:t>When </a:t>
+            </a:r>
+            <a:r>
+              <a:rPr b="1" lang="fr" sz="1800"/>
+              <a:t>REGISTER </a:t>
+            </a:r>
+            <a:r>
+              <a:rPr lang="fr" sz="1800"/>
+              <a:t>button is clicked:</a:t>
+            </a:r>
+            <a:endParaRPr sz="1800"/>
+          </a:p>
+          <a:p>
+            <a:pPr indent="-342900" lvl="2" marL="1371600" rtl="0" algn="l">
+              <a:spcBef>
+                <a:spcPts val="0"/>
+              </a:spcBef>
+              <a:spcAft>
+                <a:spcPts val="0"/>
+              </a:spcAft>
+              <a:buSzPts val="1800"/>
+              <a:buChar char="■"/>
+            </a:pPr>
+            <a:r>
+              <a:rPr lang="fr" sz="1800"/>
+              <a:t>IF </a:t>
+            </a:r>
+            <a:r>
+              <a:rPr b="1" lang="fr" sz="1800"/>
+              <a:t>username </a:t>
+            </a:r>
+            <a:r>
+              <a:rPr lang="fr" sz="1800"/>
+              <a:t>/ hashed </a:t>
+            </a:r>
+            <a:r>
+              <a:rPr b="1" lang="fr" sz="1800"/>
+              <a:t>password </a:t>
+            </a:r>
+            <a:r>
+              <a:rPr lang="fr" sz="1800"/>
+              <a:t>added to database </a:t>
+            </a:r>
+            <a:r>
+              <a:rPr lang="fr" sz="1800"/>
+              <a:t>then:</a:t>
+            </a:r>
+            <a:endParaRPr sz="1800"/>
+          </a:p>
+          <a:p>
+            <a:pPr indent="-342900" lvl="3" marL="1828800" rtl="0" algn="l">
+              <a:spcBef>
+                <a:spcPts val="0"/>
+              </a:spcBef>
+              <a:spcAft>
+                <a:spcPts val="0"/>
+              </a:spcAft>
+              <a:buSzPts val="1800"/>
+              <a:buChar char="●"/>
+            </a:pPr>
+            <a:r>
+              <a:rPr lang="fr" sz="1800"/>
+              <a:t>Redirect to </a:t>
+            </a:r>
+            <a:r>
+              <a:rPr b="1" lang="fr" sz="1800"/>
+              <a:t>login </a:t>
+            </a:r>
+            <a:r>
+              <a:rPr lang="fr" sz="1800"/>
+              <a:t>page</a:t>
+            </a:r>
+            <a:endParaRPr sz="1800"/>
+          </a:p>
+          <a:p>
+            <a:pPr indent="-342900" lvl="2" marL="1371600" rtl="0" algn="l">
+              <a:spcBef>
+                <a:spcPts val="0"/>
+              </a:spcBef>
+              <a:spcAft>
+                <a:spcPts val="0"/>
+              </a:spcAft>
+              <a:buSzPts val="1800"/>
+              <a:buChar char="■"/>
+            </a:pPr>
+            <a:r>
+              <a:rPr lang="fr" sz="1800"/>
+              <a:t>ELSE </a:t>
+            </a:r>
+            <a:endParaRPr sz="1800"/>
+          </a:p>
+          <a:p>
+            <a:pPr indent="-342900" lvl="3" marL="1828800" rtl="0" algn="l">
+              <a:spcBef>
+                <a:spcPts val="0"/>
+              </a:spcBef>
+              <a:spcAft>
+                <a:spcPts val="0"/>
+              </a:spcAft>
+              <a:buSzPts val="1800"/>
+              <a:buChar char="●"/>
+            </a:pPr>
+            <a:r>
+              <a:rPr lang="fr" sz="1800"/>
+              <a:t>Go back to register form with error message</a:t>
+            </a:r>
+            <a:endParaRPr sz="1800"/>
+          </a:p>
+          <a:p>
+            <a:pPr indent="-342900" lvl="1" marL="914400" rtl="0" algn="l">
+              <a:spcBef>
+                <a:spcPts val="0"/>
+              </a:spcBef>
+              <a:spcAft>
+                <a:spcPts val="0"/>
+              </a:spcAft>
+              <a:buSzPts val="1800"/>
+              <a:buChar char="○"/>
+            </a:pPr>
+            <a:r>
+              <a:rPr lang="fr" sz="1800"/>
+              <a:t>Go to </a:t>
+            </a:r>
+            <a:r>
+              <a:rPr b="1" lang="fr" sz="1800"/>
+              <a:t>register </a:t>
+            </a:r>
+            <a:r>
+              <a:rPr lang="fr" sz="1800"/>
+              <a:t>page</a:t>
+            </a:r>
+            <a:endParaRPr sz="1800"/>
+          </a:p>
+          <a:p>
+            <a:pPr indent="-342900" lvl="0" marL="457200" rtl="0" algn="l">
+              <a:spcBef>
+                <a:spcPts val="0"/>
+              </a:spcBef>
+              <a:spcAft>
+                <a:spcPts val="0"/>
+              </a:spcAft>
+              <a:buSzPts val="1800"/>
+              <a:buChar char="●"/>
+            </a:pPr>
+            <a:r>
+              <a:rPr lang="fr"/>
+              <a:t>ELSE field values are invalid, display </a:t>
+            </a:r>
+            <a:r>
+              <a:rPr b="1" lang="fr"/>
+              <a:t>register </a:t>
+            </a:r>
+            <a:r>
+              <a:rPr lang="fr"/>
+              <a:t>form with error message</a:t>
+            </a:r>
+            <a:endParaRPr sz="1800"/>
+          </a:p>
+          <a:p>
+            <a:pPr indent="0" lvl="0" marL="1371600" rtl="0" algn="l">
+              <a:spcBef>
+                <a:spcPts val="1600"/>
+              </a:spcBef>
+              <a:spcAft>
+                <a:spcPts val="0"/>
+              </a:spcAft>
+              <a:buNone/>
+            </a:pPr>
+            <a:r>
+              <a:t/>
+            </a:r>
+            <a:endParaRPr sz="1800"/>
+          </a:p>
+          <a:p>
+            <a:pPr indent="0" lvl="0" marL="457200" rtl="0" algn="l">
+              <a:spcBef>
+                <a:spcPts val="1600"/>
+              </a:spcBef>
+              <a:spcAft>
+                <a:spcPts val="0"/>
+              </a:spcAft>
+              <a:buNone/>
+            </a:pPr>
+            <a:r>
+              <a:t/>
+            </a:r>
+            <a:endParaRPr b="1" u="sng"/>
+          </a:p>
+          <a:p>
+            <a:pPr indent="0" lvl="0" marL="914400" rtl="0" algn="l">
+              <a:spcBef>
+                <a:spcPts val="1600"/>
+              </a:spcBef>
+              <a:spcAft>
+                <a:spcPts val="1600"/>
+              </a:spcAft>
+              <a:buNone/>
+            </a:pPr>
+            <a:r>
+              <a:t/>
+            </a:r>
+            <a:endParaRPr/>
+          </a:p>
+        </p:txBody>
+      </p:sp>
+    </p:spTree>
+  </p:cSld>
+  <p:clrMapOvr>
+    <a:masterClrMapping/>
+  </p:clrMapOvr>
+</p:sld>
+</file>
+
+<file path=ppt/slides/slide9.xml><?xml version="1.0" encoding="utf-8"?>
+<p:sld xmlns:a="http://schemas.openxmlformats.org/drawingml/2006/main" xmlns:r="http://schemas.openxmlformats.org/officeDocument/2006/relationships" xmlns:mc="http://schemas.openxmlformats.org/markup-compatibility/2006" xmlns:mv="urn:schemas-microsoft-com:mac:vml" xmlns:p="http://schemas.openxmlformats.org/presentationml/2006/main" xmlns:c="http://schemas.openxmlformats.org/drawingml/2006/chart" xmlns:dgm="http://schemas.openxmlformats.org/drawingml/2006/diagram" xmlns:o="urn:schemas-microsoft-com:office:office" xmlns:v="urn:schemas-microsoft-com:vml" xmlns:pvml="urn:schemas-microsoft-com:office:powerpoint" xmlns:com="http://schemas.openxmlformats.org/drawingml/2006/compatibility" xmlns:p14="http://schemas.microsoft.com/office/powerpoint/2010/main" xmlns:p15="http://schemas.microsoft.com/office/powerpoint/2012/main">
+  <p:cSld>
+    <p:spTree>
+      <p:nvGrpSpPr>
+        <p:cNvPr id="98" name="Shape 98"/>
+        <p:cNvGrpSpPr/>
+        <p:nvPr/>
+      </p:nvGrpSpPr>
+      <p:grpSpPr>
+        <a:xfrm>
+          <a:off x="0" y="0"/>
+          <a:ext cx="0" cy="0"/>
+          <a:chOff x="0" y="0"/>
+          <a:chExt cx="0" cy="0"/>
+        </a:xfrm>
+      </p:grpSpPr>
+      <p:sp>
+        <p:nvSpPr>
+          <p:cNvPr id="99" name="Google Shape;99;p21"/>
           <p:cNvSpPr txBox="1"/>
           <p:nvPr>
             <p:ph idx="1" type="body"/>
@@ -6973,642 +10127,11 @@
                 <a:spcPts val="0"/>
               </a:spcAft>
               <a:buSzPts val="2400"/>
-              <a:buAutoNum type="arabicPeriod" startAt="5"/>
+              <a:buAutoNum type="arabicPeriod" startAt="4"/>
             </a:pPr>
             <a:r>
               <a:rPr b="1" lang="fr" sz="2400"/>
-              <a:t>Patient profile lookup</a:t>
-            </a:r>
-            <a:endParaRPr b="1" sz="2400"/>
-          </a:p>
-        </p:txBody>
-      </p:sp>
-    </p:spTree>
-  </p:cSld>
-  <p:clrMapOvr>
-    <a:masterClrMapping/>
-  </p:clrMapOvr>
-</p:sld>
-</file>
-
-<file path=ppt/slides/slide7.xml><?xml version="1.0" encoding="utf-8"?>
-<p:sld xmlns:a="http://schemas.openxmlformats.org/drawingml/2006/main" xmlns:r="http://schemas.openxmlformats.org/officeDocument/2006/relationships" xmlns:mc="http://schemas.openxmlformats.org/markup-compatibility/2006" xmlns:mv="urn:schemas-microsoft-com:mac:vml" xmlns:p="http://schemas.openxmlformats.org/presentationml/2006/main" xmlns:c="http://schemas.openxmlformats.org/drawingml/2006/chart" xmlns:dgm="http://schemas.openxmlformats.org/drawingml/2006/diagram" xmlns:o="urn:schemas-microsoft-com:office:office" xmlns:v="urn:schemas-microsoft-com:vml" xmlns:pvml="urn:schemas-microsoft-com:office:powerpoint" xmlns:com="http://schemas.openxmlformats.org/drawingml/2006/compatibility" xmlns:p14="http://schemas.microsoft.com/office/powerpoint/2010/main" xmlns:p15="http://schemas.microsoft.com/office/powerpoint/2012/main">
-  <p:cSld>
-    <p:spTree>
-      <p:nvGrpSpPr>
-        <p:cNvPr id="84" name="Shape 84"/>
-        <p:cNvGrpSpPr/>
-        <p:nvPr/>
-      </p:nvGrpSpPr>
-      <p:grpSpPr>
-        <a:xfrm>
-          <a:off x="0" y="0"/>
-          <a:ext cx="0" cy="0"/>
-          <a:chOff x="0" y="0"/>
-          <a:chExt cx="0" cy="0"/>
-        </a:xfrm>
-      </p:grpSpPr>
-      <p:sp>
-        <p:nvSpPr>
-          <p:cNvPr id="85" name="Google Shape;85;p19"/>
-          <p:cNvSpPr txBox="1"/>
-          <p:nvPr>
-            <p:ph type="title"/>
-          </p:nvPr>
-        </p:nvSpPr>
-        <p:spPr>
-          <a:xfrm>
-            <a:off x="311700" y="-88375"/>
-            <a:ext cx="8520600" cy="572700"/>
-          </a:xfrm>
-          <a:prstGeom prst="rect">
-            <a:avLst/>
-          </a:prstGeom>
-        </p:spPr>
-        <p:txBody>
-          <a:bodyPr anchorCtr="0" anchor="t" bIns="91425" lIns="91425" spcFirstLastPara="1" rIns="91425" wrap="square" tIns="91425">
-            <a:noAutofit/>
-          </a:bodyPr>
-          <a:lstStyle/>
-          <a:p>
-            <a:pPr indent="0" lvl="0" marL="0" rtl="0" algn="l">
-              <a:spcBef>
-                <a:spcPts val="0"/>
-              </a:spcBef>
-              <a:spcAft>
-                <a:spcPts val="0"/>
-              </a:spcAft>
-              <a:buNone/>
-            </a:pPr>
-            <a:r>
-              <a:rPr lang="fr"/>
-              <a:t>Abstract Code - </a:t>
-            </a:r>
-            <a:r>
-              <a:rPr lang="fr"/>
-              <a:t>Patient profile lookup</a:t>
-            </a:r>
-            <a:endParaRPr/>
-          </a:p>
-        </p:txBody>
-      </p:sp>
-      <p:sp>
-        <p:nvSpPr>
-          <p:cNvPr id="86" name="Google Shape;86;p19"/>
-          <p:cNvSpPr txBox="1"/>
-          <p:nvPr>
-            <p:ph idx="1" type="body"/>
-          </p:nvPr>
-        </p:nvSpPr>
-        <p:spPr>
-          <a:xfrm>
-            <a:off x="311700" y="390475"/>
-            <a:ext cx="8520600" cy="4570200"/>
-          </a:xfrm>
-          <a:prstGeom prst="rect">
-            <a:avLst/>
-          </a:prstGeom>
-        </p:spPr>
-        <p:txBody>
-          <a:bodyPr anchorCtr="0" anchor="t" bIns="91425" lIns="91425" spcFirstLastPara="1" rIns="91425" wrap="square" tIns="91425">
-            <a:noAutofit/>
-          </a:bodyPr>
-          <a:lstStyle/>
-          <a:p>
-            <a:pPr indent="0" lvl="0" marL="0" rtl="0" algn="l">
-              <a:spcBef>
-                <a:spcPts val="0"/>
-              </a:spcBef>
-              <a:spcAft>
-                <a:spcPts val="0"/>
-              </a:spcAft>
-              <a:buNone/>
-            </a:pPr>
-            <a:r>
-              <a:rPr b="1" lang="fr" u="sng"/>
-              <a:t>Task d</a:t>
-            </a:r>
-            <a:r>
-              <a:rPr b="1" lang="fr" u="sng"/>
-              <a:t>ecomposition flow</a:t>
-            </a:r>
-            <a:endParaRPr b="1" u="sng"/>
-          </a:p>
-          <a:p>
-            <a:pPr indent="-342900" lvl="0" marL="457200" rtl="0" algn="l">
-              <a:spcBef>
-                <a:spcPts val="1600"/>
-              </a:spcBef>
-              <a:spcAft>
-                <a:spcPts val="0"/>
-              </a:spcAft>
-              <a:buSzPts val="1800"/>
-              <a:buChar char="●"/>
-            </a:pPr>
-            <a:r>
-              <a:rPr lang="fr"/>
-              <a:t>Lookup the database to verify whether patient exists (based on </a:t>
-            </a:r>
-            <a:r>
-              <a:rPr lang="fr"/>
-              <a:t>HealthCardNr</a:t>
-            </a:r>
-            <a:r>
-              <a:rPr lang="fr"/>
-              <a:t>)</a:t>
-            </a:r>
-            <a:endParaRPr/>
-          </a:p>
-          <a:p>
-            <a:pPr indent="-342900" lvl="0" marL="457200" rtl="0" algn="l">
-              <a:spcBef>
-                <a:spcPts val="0"/>
-              </a:spcBef>
-              <a:spcAft>
-                <a:spcPts val="0"/>
-              </a:spcAft>
-              <a:buSzPts val="1800"/>
-              <a:buChar char="●"/>
-            </a:pPr>
-            <a:r>
-              <a:rPr lang="fr"/>
-              <a:t>Requires HealthCardNr</a:t>
-            </a:r>
-            <a:endParaRPr/>
-          </a:p>
-          <a:p>
-            <a:pPr indent="-342900" lvl="0" marL="457200" rtl="0" algn="l">
-              <a:spcBef>
-                <a:spcPts val="0"/>
-              </a:spcBef>
-              <a:spcAft>
-                <a:spcPts val="0"/>
-              </a:spcAft>
-              <a:buSzPts val="1800"/>
-              <a:buChar char="●"/>
-            </a:pPr>
-            <a:r>
-              <a:rPr lang="fr"/>
-              <a:t>Confirm that user has been found in the database</a:t>
-            </a:r>
-            <a:endParaRPr/>
-          </a:p>
-          <a:p>
-            <a:pPr indent="-342900" lvl="0" marL="457200" rtl="0" algn="l">
-              <a:spcBef>
-                <a:spcPts val="0"/>
-              </a:spcBef>
-              <a:spcAft>
-                <a:spcPts val="0"/>
-              </a:spcAft>
-              <a:buSzPts val="1800"/>
-              <a:buChar char="●"/>
-            </a:pPr>
-            <a:r>
-              <a:rPr lang="fr"/>
-              <a:t>Same frequency (1 search at a time)</a:t>
-            </a:r>
-            <a:endParaRPr/>
-          </a:p>
-          <a:p>
-            <a:pPr indent="-342900" lvl="0" marL="457200" rtl="0" algn="l">
-              <a:spcBef>
-                <a:spcPts val="0"/>
-              </a:spcBef>
-              <a:spcAft>
-                <a:spcPts val="0"/>
-              </a:spcAft>
-              <a:buSzPts val="1800"/>
-              <a:buChar char="●"/>
-            </a:pPr>
-            <a:r>
-              <a:rPr lang="fr"/>
-              <a:t>Consistency is key</a:t>
-            </a:r>
-            <a:endParaRPr/>
-          </a:p>
-          <a:p>
-            <a:pPr indent="-342900" lvl="0" marL="457200" rtl="0" algn="l">
-              <a:spcBef>
-                <a:spcPts val="0"/>
-              </a:spcBef>
-              <a:spcAft>
-                <a:spcPts val="0"/>
-              </a:spcAft>
-              <a:buSzPts val="1800"/>
-              <a:buChar char="●"/>
-            </a:pPr>
-            <a:r>
-              <a:rPr lang="fr"/>
-              <a:t>No Mother Task Needed</a:t>
-            </a:r>
-            <a:endParaRPr/>
-          </a:p>
-          <a:p>
-            <a:pPr indent="0" lvl="0" marL="914400" rtl="0" algn="l">
-              <a:spcBef>
-                <a:spcPts val="1600"/>
-              </a:spcBef>
-              <a:spcAft>
-                <a:spcPts val="1600"/>
-              </a:spcAft>
-              <a:buNone/>
-            </a:pPr>
-            <a:r>
-              <a:t/>
-            </a:r>
-            <a:endParaRPr/>
-          </a:p>
-        </p:txBody>
-      </p:sp>
-    </p:spTree>
-  </p:cSld>
-  <p:clrMapOvr>
-    <a:masterClrMapping/>
-  </p:clrMapOvr>
-</p:sld>
-</file>
-
-<file path=ppt/slides/slide8.xml><?xml version="1.0" encoding="utf-8"?>
-<p:sld xmlns:a="http://schemas.openxmlformats.org/drawingml/2006/main" xmlns:r="http://schemas.openxmlformats.org/officeDocument/2006/relationships" xmlns:mc="http://schemas.openxmlformats.org/markup-compatibility/2006" xmlns:mv="urn:schemas-microsoft-com:mac:vml" xmlns:p="http://schemas.openxmlformats.org/presentationml/2006/main" xmlns:c="http://schemas.openxmlformats.org/drawingml/2006/chart" xmlns:dgm="http://schemas.openxmlformats.org/drawingml/2006/diagram" xmlns:o="urn:schemas-microsoft-com:office:office" xmlns:v="urn:schemas-microsoft-com:vml" xmlns:pvml="urn:schemas-microsoft-com:office:powerpoint" xmlns:com="http://schemas.openxmlformats.org/drawingml/2006/compatibility" xmlns:p14="http://schemas.microsoft.com/office/powerpoint/2010/main" xmlns:p15="http://schemas.microsoft.com/office/powerpoint/2012/main">
-  <p:cSld>
-    <p:spTree>
-      <p:nvGrpSpPr>
-        <p:cNvPr id="90" name="Shape 90"/>
-        <p:cNvGrpSpPr/>
-        <p:nvPr/>
-      </p:nvGrpSpPr>
-      <p:grpSpPr>
-        <a:xfrm>
-          <a:off x="0" y="0"/>
-          <a:ext cx="0" cy="0"/>
-          <a:chOff x="0" y="0"/>
-          <a:chExt cx="0" cy="0"/>
-        </a:xfrm>
-      </p:grpSpPr>
-      <p:sp>
-        <p:nvSpPr>
-          <p:cNvPr id="91" name="Google Shape;91;p20"/>
-          <p:cNvSpPr txBox="1"/>
-          <p:nvPr>
-            <p:ph type="title"/>
-          </p:nvPr>
-        </p:nvSpPr>
-        <p:spPr>
-          <a:xfrm>
-            <a:off x="311700" y="-88375"/>
-            <a:ext cx="8520600" cy="572700"/>
-          </a:xfrm>
-          <a:prstGeom prst="rect">
-            <a:avLst/>
-          </a:prstGeom>
-        </p:spPr>
-        <p:txBody>
-          <a:bodyPr anchorCtr="0" anchor="t" bIns="91425" lIns="91425" spcFirstLastPara="1" rIns="91425" wrap="square" tIns="91425">
-            <a:noAutofit/>
-          </a:bodyPr>
-          <a:lstStyle/>
-          <a:p>
-            <a:pPr indent="0" lvl="0" marL="0" rtl="0" algn="l">
-              <a:spcBef>
-                <a:spcPts val="0"/>
-              </a:spcBef>
-              <a:spcAft>
-                <a:spcPts val="0"/>
-              </a:spcAft>
-              <a:buClr>
-                <a:schemeClr val="dk1"/>
-              </a:buClr>
-              <a:buSzPts val="1100"/>
-              <a:buFont typeface="Arial"/>
-              <a:buNone/>
-            </a:pPr>
-            <a:r>
-              <a:rPr lang="fr"/>
-              <a:t>Abstract Code - Patient profile lookup</a:t>
-            </a:r>
-            <a:endParaRPr/>
-          </a:p>
-          <a:p>
-            <a:pPr indent="0" lvl="0" marL="0" rtl="0" algn="l">
-              <a:spcBef>
-                <a:spcPts val="0"/>
-              </a:spcBef>
-              <a:spcAft>
-                <a:spcPts val="0"/>
-              </a:spcAft>
-              <a:buNone/>
-            </a:pPr>
-            <a:r>
-              <a:t/>
-            </a:r>
-            <a:endParaRPr/>
-          </a:p>
-        </p:txBody>
-      </p:sp>
-      <p:sp>
-        <p:nvSpPr>
-          <p:cNvPr id="92" name="Google Shape;92;p20"/>
-          <p:cNvSpPr txBox="1"/>
-          <p:nvPr>
-            <p:ph idx="1" type="body"/>
-          </p:nvPr>
-        </p:nvSpPr>
-        <p:spPr>
-          <a:xfrm>
-            <a:off x="311700" y="390475"/>
-            <a:ext cx="8520600" cy="4570200"/>
-          </a:xfrm>
-          <a:prstGeom prst="rect">
-            <a:avLst/>
-          </a:prstGeom>
-        </p:spPr>
-        <p:txBody>
-          <a:bodyPr anchorCtr="0" anchor="t" bIns="91425" lIns="91425" spcFirstLastPara="1" rIns="91425" wrap="square" tIns="91425">
-            <a:noAutofit/>
-          </a:bodyPr>
-          <a:lstStyle/>
-          <a:p>
-            <a:pPr indent="0" lvl="0" marL="0" rtl="0" algn="l">
-              <a:spcBef>
-                <a:spcPts val="0"/>
-              </a:spcBef>
-              <a:spcAft>
-                <a:spcPts val="0"/>
-              </a:spcAft>
-              <a:buNone/>
-            </a:pPr>
-            <a:r>
-              <a:rPr b="1" lang="fr" u="sng"/>
-              <a:t>Abstract Code</a:t>
-            </a:r>
-            <a:endParaRPr b="1" u="sng"/>
-          </a:p>
-          <a:p>
-            <a:pPr indent="-342900" lvl="0" marL="457200" rtl="0" algn="l">
-              <a:spcBef>
-                <a:spcPts val="1600"/>
-              </a:spcBef>
-              <a:spcAft>
-                <a:spcPts val="0"/>
-              </a:spcAft>
-              <a:buSzPts val="1800"/>
-              <a:buChar char="●"/>
-            </a:pPr>
-            <a:r>
-              <a:rPr lang="fr"/>
-              <a:t>User enters HealthCardNr input field. </a:t>
-            </a:r>
-            <a:endParaRPr/>
-          </a:p>
-          <a:p>
-            <a:pPr indent="-342900" lvl="0" marL="457200" rtl="0" algn="l">
-              <a:spcBef>
-                <a:spcPts val="0"/>
-              </a:spcBef>
-              <a:spcAft>
-                <a:spcPts val="0"/>
-              </a:spcAft>
-              <a:buSzPts val="1800"/>
-              <a:buChar char="●"/>
-            </a:pPr>
-            <a:r>
-              <a:rPr lang="fr"/>
-              <a:t>IF input field NOT empty AND do not contain any invalid characters THEN:</a:t>
-            </a:r>
-            <a:endParaRPr/>
-          </a:p>
-          <a:p>
-            <a:pPr indent="-342900" lvl="1" marL="914400" rtl="0" algn="l">
-              <a:spcBef>
-                <a:spcPts val="0"/>
-              </a:spcBef>
-              <a:spcAft>
-                <a:spcPts val="0"/>
-              </a:spcAft>
-              <a:buSzPts val="1800"/>
-              <a:buChar char="○"/>
-            </a:pPr>
-            <a:r>
-              <a:rPr lang="fr" sz="1800"/>
-              <a:t>When SEARCH button is clicked:</a:t>
-            </a:r>
-            <a:endParaRPr sz="1800"/>
-          </a:p>
-          <a:p>
-            <a:pPr indent="-342900" lvl="2" marL="1371600" rtl="0" algn="l">
-              <a:spcBef>
-                <a:spcPts val="0"/>
-              </a:spcBef>
-              <a:spcAft>
-                <a:spcPts val="0"/>
-              </a:spcAft>
-              <a:buSzPts val="1800"/>
-              <a:buChar char="■"/>
-            </a:pPr>
-            <a:r>
-              <a:rPr lang="fr" sz="1800"/>
-              <a:t>IF HealthCardNr is found then:</a:t>
-            </a:r>
-            <a:endParaRPr sz="1800"/>
-          </a:p>
-          <a:p>
-            <a:pPr indent="-342900" lvl="3" marL="1828800" rtl="0" algn="l">
-              <a:spcBef>
-                <a:spcPts val="0"/>
-              </a:spcBef>
-              <a:spcAft>
-                <a:spcPts val="0"/>
-              </a:spcAft>
-              <a:buSzPts val="1800"/>
-              <a:buChar char="●"/>
-            </a:pPr>
-            <a:r>
-              <a:rPr lang="fr" sz="1800"/>
-              <a:t>Redirect to patient profile page</a:t>
-            </a:r>
-            <a:endParaRPr sz="1800"/>
-          </a:p>
-          <a:p>
-            <a:pPr indent="-342900" lvl="2" marL="1371600" rtl="0" algn="l">
-              <a:spcBef>
-                <a:spcPts val="0"/>
-              </a:spcBef>
-              <a:spcAft>
-                <a:spcPts val="0"/>
-              </a:spcAft>
-              <a:buSzPts val="1800"/>
-              <a:buChar char="■"/>
-            </a:pPr>
-            <a:r>
-              <a:rPr lang="fr" sz="1800"/>
-              <a:t>ELSE </a:t>
-            </a:r>
-            <a:endParaRPr sz="1800"/>
-          </a:p>
-          <a:p>
-            <a:pPr indent="-342900" lvl="3" marL="1828800" rtl="0" algn="l">
-              <a:spcBef>
-                <a:spcPts val="0"/>
-              </a:spcBef>
-              <a:spcAft>
-                <a:spcPts val="0"/>
-              </a:spcAft>
-              <a:buSzPts val="1800"/>
-              <a:buChar char="●"/>
-            </a:pPr>
-            <a:r>
-              <a:rPr lang="fr" sz="1800"/>
-              <a:t>G</a:t>
-            </a:r>
-            <a:r>
-              <a:rPr lang="fr" sz="1800"/>
-              <a:t>o back to search form with error message</a:t>
-            </a:r>
-            <a:endParaRPr sz="1800"/>
-          </a:p>
-          <a:p>
-            <a:pPr indent="-342900" lvl="1" marL="914400" rtl="0" algn="l">
-              <a:spcBef>
-                <a:spcPts val="0"/>
-              </a:spcBef>
-              <a:spcAft>
-                <a:spcPts val="0"/>
-              </a:spcAft>
-              <a:buSzPts val="1800"/>
-              <a:buChar char="○"/>
-            </a:pPr>
-            <a:r>
-              <a:rPr lang="fr" sz="1800"/>
-              <a:t>Go to profile page</a:t>
-            </a:r>
-            <a:endParaRPr sz="1800"/>
-          </a:p>
-          <a:p>
-            <a:pPr indent="-342900" lvl="0" marL="457200" rtl="0" algn="l">
-              <a:spcBef>
-                <a:spcPts val="0"/>
-              </a:spcBef>
-              <a:spcAft>
-                <a:spcPts val="0"/>
-              </a:spcAft>
-              <a:buSzPts val="1800"/>
-              <a:buChar char="●"/>
-            </a:pPr>
-            <a:r>
-              <a:rPr lang="fr"/>
-              <a:t>ELSE field values are invalid, display search form with error message</a:t>
-            </a:r>
-            <a:endParaRPr sz="1800"/>
-          </a:p>
-          <a:p>
-            <a:pPr indent="0" lvl="0" marL="1371600" rtl="0" algn="l">
-              <a:spcBef>
-                <a:spcPts val="1600"/>
-              </a:spcBef>
-              <a:spcAft>
-                <a:spcPts val="0"/>
-              </a:spcAft>
-              <a:buNone/>
-            </a:pPr>
-            <a:r>
-              <a:t/>
-            </a:r>
-            <a:endParaRPr sz="1800"/>
-          </a:p>
-          <a:p>
-            <a:pPr indent="0" lvl="0" marL="457200" rtl="0" algn="l">
-              <a:spcBef>
-                <a:spcPts val="1600"/>
-              </a:spcBef>
-              <a:spcAft>
-                <a:spcPts val="0"/>
-              </a:spcAft>
-              <a:buNone/>
-            </a:pPr>
-            <a:r>
-              <a:t/>
-            </a:r>
-            <a:endParaRPr b="1" u="sng"/>
-          </a:p>
-          <a:p>
-            <a:pPr indent="0" lvl="0" marL="914400" rtl="0" algn="l">
-              <a:spcBef>
-                <a:spcPts val="1600"/>
-              </a:spcBef>
-              <a:spcAft>
-                <a:spcPts val="1600"/>
-              </a:spcAft>
-              <a:buNone/>
-            </a:pPr>
-            <a:r>
-              <a:t/>
-            </a:r>
-            <a:endParaRPr/>
-          </a:p>
-        </p:txBody>
-      </p:sp>
-    </p:spTree>
-  </p:cSld>
-  <p:clrMapOvr>
-    <a:masterClrMapping/>
-  </p:clrMapOvr>
-</p:sld>
-</file>
-
-<file path=ppt/slides/slide9.xml><?xml version="1.0" encoding="utf-8"?>
-<p:sld xmlns:a="http://schemas.openxmlformats.org/drawingml/2006/main" xmlns:r="http://schemas.openxmlformats.org/officeDocument/2006/relationships" xmlns:mc="http://schemas.openxmlformats.org/markup-compatibility/2006" xmlns:mv="urn:schemas-microsoft-com:mac:vml" xmlns:p="http://schemas.openxmlformats.org/presentationml/2006/main" xmlns:c="http://schemas.openxmlformats.org/drawingml/2006/chart" xmlns:dgm="http://schemas.openxmlformats.org/drawingml/2006/diagram" xmlns:o="urn:schemas-microsoft-com:office:office" xmlns:v="urn:schemas-microsoft-com:vml" xmlns:pvml="urn:schemas-microsoft-com:office:powerpoint" xmlns:com="http://schemas.openxmlformats.org/drawingml/2006/compatibility" xmlns:p14="http://schemas.microsoft.com/office/powerpoint/2010/main" xmlns:p15="http://schemas.microsoft.com/office/powerpoint/2012/main">
-  <p:cSld>
-    <p:spTree>
-      <p:nvGrpSpPr>
-        <p:cNvPr id="96" name="Shape 96"/>
-        <p:cNvGrpSpPr/>
-        <p:nvPr/>
-      </p:nvGrpSpPr>
-      <p:grpSpPr>
-        <a:xfrm>
-          <a:off x="0" y="0"/>
-          <a:ext cx="0" cy="0"/>
-          <a:chOff x="0" y="0"/>
-          <a:chExt cx="0" cy="0"/>
-        </a:xfrm>
-      </p:grpSpPr>
-      <p:sp>
-        <p:nvSpPr>
-          <p:cNvPr id="97" name="Google Shape;97;p21"/>
-          <p:cNvSpPr txBox="1"/>
-          <p:nvPr>
-            <p:ph idx="1" type="body"/>
-          </p:nvPr>
-        </p:nvSpPr>
-        <p:spPr>
-          <a:xfrm>
-            <a:off x="311700" y="619075"/>
-            <a:ext cx="8520600" cy="3416400"/>
-          </a:xfrm>
-          <a:prstGeom prst="rect">
-            <a:avLst/>
-          </a:prstGeom>
-        </p:spPr>
-        <p:txBody>
-          <a:bodyPr anchorCtr="0" anchor="ctr" bIns="91425" lIns="91425" spcFirstLastPara="1" rIns="91425" wrap="square" tIns="91425">
-            <a:noAutofit/>
-          </a:bodyPr>
-          <a:lstStyle/>
-          <a:p>
-            <a:pPr indent="-381000" lvl="0" marL="457200" rtl="0" algn="ctr">
-              <a:spcBef>
-                <a:spcPts val="0"/>
-              </a:spcBef>
-              <a:spcAft>
-                <a:spcPts val="0"/>
-              </a:spcAft>
-              <a:buSzPts val="2400"/>
-              <a:buAutoNum type="arabicPeriod" startAt="6"/>
-            </a:pPr>
-            <a:r>
-              <a:rPr b="1" lang="fr" sz="2400"/>
-              <a:t>Patient detail entry</a:t>
+              <a:t>Care provider login</a:t>
             </a:r>
             <a:endParaRPr b="1" sz="2400"/>
           </a:p>

</xml_diff>